<commit_message>
add nametags to slides
</commit_message>
<xml_diff>
--- a/presentation.pptx
+++ b/presentation.pptx
@@ -506,7 +506,7 @@
       </p:grpSpPr>
       <p:sp>
         <p:nvSpPr>
-          <p:cNvPr id="2" name="Folienbildplatzhalter 1"/>
+          <p:cNvPr id="2" name="Slide Image Placeholder 1"/>
           <p:cNvSpPr>
             <a:spLocks noGrp="1" noRot="1" noChangeAspect="1"/>
           </p:cNvSpPr>
@@ -518,7 +518,7 @@
       </p:sp>
       <p:sp>
         <p:nvSpPr>
-          <p:cNvPr id="3" name="Notizenplatzhalter 2"/>
+          <p:cNvPr id="3" name="Notes Placeholder 2"/>
           <p:cNvSpPr>
             <a:spLocks noGrp="1"/>
           </p:cNvSpPr>
@@ -531,13 +531,16 @@
           <a:bodyPr/>
           <a:lstStyle/>
           <a:p>
-            <a:endParaRPr lang="de-DE" dirty="0"/>
+            <a:r>
+              <a:rPr lang="en-DE" dirty="0"/>
+              <a:t>Felix</a:t>
+            </a:r>
           </a:p>
         </p:txBody>
       </p:sp>
       <p:sp>
         <p:nvSpPr>
-          <p:cNvPr id="4" name="Foliennummernplatzhalter 3"/>
+          <p:cNvPr id="4" name="Slide Number Placeholder 3"/>
           <p:cNvSpPr>
             <a:spLocks noGrp="1"/>
           </p:cNvSpPr>
@@ -552,7 +555,7 @@
           <a:p>
             <a:fld id="{AEAFCDA7-1A8B-6E40-88EB-952C2E72DED4}" type="slidenum">
               <a:rPr lang="de-DE" smtClean="0"/>
-              <a:t>2</a:t>
+              <a:t>1</a:t>
             </a:fld>
             <a:endParaRPr lang="de-DE"/>
           </a:p>
@@ -561,7 +564,7 @@
     </p:spTree>
     <p:extLst>
       <p:ext uri="{BB962C8B-B14F-4D97-AF65-F5344CB8AC3E}">
-        <p14:creationId xmlns:p14="http://schemas.microsoft.com/office/powerpoint/2010/main" val="296252648"/>
+        <p14:creationId xmlns:p14="http://schemas.microsoft.com/office/powerpoint/2010/main" val="286160094"/>
       </p:ext>
     </p:extLst>
   </p:cSld>
@@ -590,7 +593,7 @@
       </p:grpSpPr>
       <p:sp>
         <p:nvSpPr>
-          <p:cNvPr id="2" name="Folienbildplatzhalter 1"/>
+          <p:cNvPr id="2" name="Slide Image Placeholder 1"/>
           <p:cNvSpPr>
             <a:spLocks noGrp="1" noRot="1" noChangeAspect="1"/>
           </p:cNvSpPr>
@@ -602,7 +605,7 @@
       </p:sp>
       <p:sp>
         <p:nvSpPr>
-          <p:cNvPr id="3" name="Notizenplatzhalter 2"/>
+          <p:cNvPr id="3" name="Notes Placeholder 2"/>
           <p:cNvSpPr>
             <a:spLocks noGrp="1"/>
           </p:cNvSpPr>
@@ -615,246 +618,16 @@
           <a:bodyPr/>
           <a:lstStyle/>
           <a:p>
-            <a:pPr marL="171450" indent="-171450">
-              <a:buFontTx/>
-              <a:buChar char="-"/>
-            </a:pPr>
-            <a:r>
-              <a:rPr lang="de-DE" dirty="0" err="1"/>
-              <a:t>If</a:t>
-            </a:r>
-            <a:r>
-              <a:rPr lang="de-DE" dirty="0"/>
-              <a:t> </a:t>
-            </a:r>
-            <a:r>
-              <a:rPr lang="de-DE" dirty="0" err="1"/>
-              <a:t>this</a:t>
-            </a:r>
-            <a:r>
-              <a:rPr lang="de-DE" dirty="0"/>
-              <a:t> </a:t>
-            </a:r>
-            <a:r>
-              <a:rPr lang="de-DE" dirty="0" err="1"/>
-              <a:t>is</a:t>
-            </a:r>
-            <a:r>
-              <a:rPr lang="de-DE" dirty="0"/>
-              <a:t> </a:t>
-            </a:r>
-            <a:r>
-              <a:rPr lang="de-DE" dirty="0" err="1"/>
-              <a:t>done</a:t>
-            </a:r>
-            <a:r>
-              <a:rPr lang="de-DE" dirty="0"/>
-              <a:t> </a:t>
-            </a:r>
-            <a:r>
-              <a:rPr lang="de-DE" dirty="0" err="1"/>
-              <a:t>within</a:t>
-            </a:r>
-            <a:r>
-              <a:rPr lang="de-DE" dirty="0"/>
-              <a:t> a </a:t>
-            </a:r>
-            <a:r>
-              <a:rPr lang="de-DE" dirty="0" err="1"/>
-              <a:t>server</a:t>
-            </a:r>
-            <a:r>
-              <a:rPr lang="de-DE" dirty="0"/>
-              <a:t> </a:t>
-            </a:r>
-            <a:r>
-              <a:rPr lang="de-DE" dirty="0" err="1"/>
-              <a:t>component</a:t>
-            </a:r>
-            <a:r>
-              <a:rPr lang="de-DE" dirty="0"/>
-              <a:t> </a:t>
-            </a:r>
-            <a:r>
-              <a:rPr lang="de-DE" dirty="0" err="1"/>
-              <a:t>or</a:t>
-            </a:r>
-            <a:r>
-              <a:rPr lang="de-DE" dirty="0"/>
-              <a:t> a </a:t>
-            </a:r>
-            <a:r>
-              <a:rPr lang="de-DE" dirty="0" err="1"/>
-              <a:t>shared</a:t>
-            </a:r>
-            <a:r>
-              <a:rPr lang="de-DE" dirty="0"/>
-              <a:t> </a:t>
-            </a:r>
-            <a:r>
-              <a:rPr lang="de-DE" dirty="0" err="1"/>
-              <a:t>component</a:t>
-            </a:r>
-            <a:r>
-              <a:rPr lang="de-DE" dirty="0"/>
-              <a:t> </a:t>
-            </a:r>
-            <a:r>
-              <a:rPr lang="de-DE" dirty="0" err="1"/>
-              <a:t>running</a:t>
-            </a:r>
-            <a:r>
-              <a:rPr lang="de-DE" dirty="0"/>
-              <a:t> on </a:t>
-            </a:r>
-            <a:r>
-              <a:rPr lang="de-DE" dirty="0" err="1"/>
-              <a:t>the</a:t>
-            </a:r>
-            <a:r>
-              <a:rPr lang="de-DE" dirty="0"/>
-              <a:t> </a:t>
-            </a:r>
-            <a:r>
-              <a:rPr lang="de-DE" dirty="0" err="1"/>
-              <a:t>server</a:t>
-            </a:r>
-            <a:r>
-              <a:rPr lang="de-DE" dirty="0"/>
-              <a:t>, </a:t>
-            </a:r>
-            <a:r>
-              <a:rPr lang="de-DE" dirty="0" err="1"/>
-              <a:t>the</a:t>
-            </a:r>
-            <a:r>
-              <a:rPr lang="de-DE" dirty="0"/>
-              <a:t> </a:t>
-            </a:r>
-            <a:r>
-              <a:rPr lang="de-DE" dirty="0" err="1"/>
-              <a:t>code</a:t>
-            </a:r>
-            <a:r>
-              <a:rPr lang="de-DE" dirty="0"/>
-              <a:t> </a:t>
-            </a:r>
-            <a:r>
-              <a:rPr lang="de-DE" dirty="0" err="1"/>
-              <a:t>of</a:t>
-            </a:r>
-            <a:r>
-              <a:rPr lang="de-DE" dirty="0"/>
-              <a:t> </a:t>
-            </a:r>
-            <a:r>
-              <a:rPr lang="de-DE" dirty="0" err="1"/>
-              <a:t>only</a:t>
-            </a:r>
-            <a:r>
-              <a:rPr lang="de-DE" dirty="0"/>
-              <a:t> </a:t>
-            </a:r>
-            <a:r>
-              <a:rPr lang="de-DE" dirty="0" err="1"/>
-              <a:t>one</a:t>
-            </a:r>
-            <a:r>
-              <a:rPr lang="de-DE" dirty="0"/>
-              <a:t> </a:t>
-            </a:r>
-            <a:r>
-              <a:rPr lang="de-DE" dirty="0" err="1"/>
-              <a:t>component</a:t>
-            </a:r>
-            <a:r>
-              <a:rPr lang="de-DE" dirty="0"/>
-              <a:t> </a:t>
-            </a:r>
-            <a:r>
-              <a:rPr lang="de-DE" dirty="0" err="1"/>
-              <a:t>is</a:t>
-            </a:r>
-            <a:r>
-              <a:rPr lang="de-DE" dirty="0"/>
-              <a:t> </a:t>
-            </a:r>
-            <a:r>
-              <a:rPr lang="de-DE" dirty="0" err="1"/>
-              <a:t>sent</a:t>
-            </a:r>
-            <a:r>
-              <a:rPr lang="de-DE" dirty="0"/>
-              <a:t> </a:t>
-            </a:r>
-            <a:r>
-              <a:rPr lang="de-DE" dirty="0" err="1"/>
-              <a:t>to</a:t>
-            </a:r>
-            <a:r>
-              <a:rPr lang="de-DE" dirty="0"/>
-              <a:t> </a:t>
-            </a:r>
-            <a:r>
-              <a:rPr lang="de-DE" dirty="0" err="1"/>
-              <a:t>the</a:t>
-            </a:r>
-            <a:r>
-              <a:rPr lang="de-DE" dirty="0"/>
-              <a:t> </a:t>
-            </a:r>
-            <a:r>
-              <a:rPr lang="de-DE" dirty="0" err="1"/>
-              <a:t>client</a:t>
-            </a:r>
-            <a:r>
-              <a:rPr lang="de-DE" dirty="0"/>
-              <a:t>.</a:t>
-            </a:r>
-          </a:p>
-          <a:p>
-            <a:pPr marL="171450" indent="-171450">
-              <a:buFontTx/>
-              <a:buChar char="-"/>
-            </a:pPr>
-            <a:r>
-              <a:rPr lang="de-DE" dirty="0" err="1"/>
-              <a:t>No</a:t>
-            </a:r>
-            <a:r>
-              <a:rPr lang="de-DE" dirty="0"/>
-              <a:t> </a:t>
-            </a:r>
-            <a:r>
-              <a:rPr lang="de-DE" dirty="0" err="1"/>
-              <a:t>lazy</a:t>
-            </a:r>
-            <a:r>
-              <a:rPr lang="de-DE" dirty="0"/>
-              <a:t> </a:t>
-            </a:r>
-            <a:r>
-              <a:rPr lang="de-DE" dirty="0" err="1"/>
-              <a:t>loading</a:t>
-            </a:r>
-            <a:r>
-              <a:rPr lang="de-DE" dirty="0"/>
-              <a:t> </a:t>
-            </a:r>
-            <a:r>
-              <a:rPr lang="de-DE" dirty="0" err="1"/>
-              <a:t>required</a:t>
-            </a:r>
-            <a:r>
-              <a:rPr lang="de-DE" dirty="0"/>
-              <a:t>.</a:t>
+            <a:r>
+              <a:rPr lang="en-DE" dirty="0"/>
+              <a:t>Felix</a:t>
             </a:r>
           </a:p>
         </p:txBody>
       </p:sp>
       <p:sp>
         <p:nvSpPr>
-          <p:cNvPr id="4" name="Foliennummernplatzhalter 3"/>
+          <p:cNvPr id="4" name="Slide Number Placeholder 3"/>
           <p:cNvSpPr>
             <a:spLocks noGrp="1"/>
           </p:cNvSpPr>
@@ -869,7 +642,7 @@
           <a:p>
             <a:fld id="{AEAFCDA7-1A8B-6E40-88EB-952C2E72DED4}" type="slidenum">
               <a:rPr lang="de-DE" smtClean="0"/>
-              <a:t>14</a:t>
+              <a:t>10</a:t>
             </a:fld>
             <a:endParaRPr lang="de-DE"/>
           </a:p>
@@ -878,7 +651,7 @@
     </p:spTree>
     <p:extLst>
       <p:ext uri="{BB962C8B-B14F-4D97-AF65-F5344CB8AC3E}">
-        <p14:creationId xmlns:p14="http://schemas.microsoft.com/office/powerpoint/2010/main" val="68261809"/>
+        <p14:creationId xmlns:p14="http://schemas.microsoft.com/office/powerpoint/2010/main" val="1212550905"/>
       </p:ext>
     </p:extLst>
   </p:cSld>
@@ -937,44 +710,8 @@
               <a:buChar char="-"/>
             </a:pPr>
             <a:r>
-              <a:rPr lang="de-DE" dirty="0" err="1"/>
-              <a:t>Let´s</a:t>
-            </a:r>
-            <a:r>
               <a:rPr lang="de-DE" dirty="0"/>
-              <a:t> </a:t>
-            </a:r>
-            <a:r>
-              <a:rPr lang="de-DE" dirty="0" err="1"/>
-              <a:t>dive</a:t>
-            </a:r>
-            <a:r>
-              <a:rPr lang="de-DE" dirty="0"/>
-              <a:t> </a:t>
-            </a:r>
-            <a:r>
-              <a:rPr lang="de-DE" dirty="0" err="1"/>
-              <a:t>into</a:t>
-            </a:r>
-            <a:r>
-              <a:rPr lang="de-DE" dirty="0"/>
-              <a:t> </a:t>
-            </a:r>
-            <a:r>
-              <a:rPr lang="de-DE" dirty="0" err="1"/>
-              <a:t>the</a:t>
-            </a:r>
-            <a:r>
-              <a:rPr lang="de-DE" dirty="0"/>
-              <a:t> </a:t>
-            </a:r>
-            <a:r>
-              <a:rPr lang="de-DE" dirty="0" err="1"/>
-              <a:t>demo</a:t>
-            </a:r>
-            <a:r>
-              <a:rPr lang="de-DE" dirty="0"/>
-              <a:t>.</a:t>
+              <a:t>Felix</a:t>
             </a:r>
           </a:p>
           <a:p>
@@ -982,9 +719,198 @@
               <a:buFontTx/>
               <a:buChar char="-"/>
             </a:pPr>
+            <a:endParaRPr lang="de-DE" dirty="0"/>
+          </a:p>
+          <a:p>
+            <a:pPr marL="171450" indent="-171450">
+              <a:buFontTx/>
+              <a:buChar char="-"/>
+            </a:pPr>
             <a:r>
               <a:rPr lang="de-DE" dirty="0"/>
-              <a:t>This </a:t>
+              <a:t>Old: Client </a:t>
+            </a:r>
+            <a:r>
+              <a:rPr lang="de-DE" dirty="0" err="1"/>
+              <a:t>components</a:t>
+            </a:r>
+            <a:r>
+              <a:rPr lang="de-DE" dirty="0"/>
+              <a:t> </a:t>
+            </a:r>
+            <a:r>
+              <a:rPr lang="de-DE" dirty="0" err="1"/>
+              <a:t>only</a:t>
+            </a:r>
+            <a:endParaRPr lang="de-DE" dirty="0"/>
+          </a:p>
+          <a:p>
+            <a:pPr marL="171450" indent="-171450">
+              <a:buFontTx/>
+              <a:buChar char="-"/>
+            </a:pPr>
+            <a:r>
+              <a:rPr lang="de-DE" dirty="0"/>
+              <a:t>New: Server </a:t>
+            </a:r>
+            <a:r>
+              <a:rPr lang="de-DE" dirty="0" err="1"/>
+              <a:t>and</a:t>
+            </a:r>
+            <a:r>
+              <a:rPr lang="de-DE" dirty="0"/>
+              <a:t> </a:t>
+            </a:r>
+            <a:r>
+              <a:rPr lang="de-DE" dirty="0" err="1"/>
+              <a:t>shared</a:t>
+            </a:r>
+            <a:r>
+              <a:rPr lang="de-DE" dirty="0"/>
+              <a:t> </a:t>
+            </a:r>
+            <a:r>
+              <a:rPr lang="de-DE" dirty="0" err="1"/>
+              <a:t>components</a:t>
+            </a:r>
+            <a:r>
+              <a:rPr lang="de-DE" dirty="0"/>
+              <a:t> </a:t>
+            </a:r>
+            <a:r>
+              <a:rPr lang="de-DE" dirty="0" err="1"/>
+              <a:t>where</a:t>
+            </a:r>
+            <a:r>
+              <a:rPr lang="de-DE" dirty="0"/>
+              <a:t> </a:t>
+            </a:r>
+            <a:r>
+              <a:rPr lang="de-DE" dirty="0" err="1"/>
+              <a:t>useful</a:t>
+            </a:r>
+            <a:endParaRPr lang="de-DE" dirty="0"/>
+          </a:p>
+          <a:p>
+            <a:pPr marL="628650" lvl="1" indent="-171450">
+              <a:buFontTx/>
+              <a:buChar char="-"/>
+            </a:pPr>
+            <a:r>
+              <a:rPr lang="de-DE" dirty="0"/>
+              <a:t>Client </a:t>
+            </a:r>
+            <a:r>
+              <a:rPr lang="de-DE" dirty="0" err="1"/>
+              <a:t>components</a:t>
+            </a:r>
+            <a:r>
+              <a:rPr lang="de-DE" dirty="0"/>
+              <a:t> </a:t>
+            </a:r>
+            <a:r>
+              <a:rPr lang="de-DE" dirty="0" err="1"/>
+              <a:t>are</a:t>
+            </a:r>
+            <a:r>
+              <a:rPr lang="de-DE" dirty="0"/>
+              <a:t> still </a:t>
+            </a:r>
+            <a:r>
+              <a:rPr lang="de-DE" dirty="0" err="1"/>
+              <a:t>important</a:t>
+            </a:r>
+            <a:r>
+              <a:rPr lang="de-DE" dirty="0"/>
+              <a:t>: </a:t>
+            </a:r>
+            <a:r>
+              <a:rPr lang="de-DE" dirty="0" err="1"/>
+              <a:t>If</a:t>
+            </a:r>
+            <a:r>
+              <a:rPr lang="de-DE" dirty="0"/>
+              <a:t> </a:t>
+            </a:r>
+            <a:r>
+              <a:rPr lang="de-DE" dirty="0" err="1"/>
+              <a:t>we</a:t>
+            </a:r>
+            <a:r>
+              <a:rPr lang="de-DE" dirty="0"/>
+              <a:t> </a:t>
+            </a:r>
+            <a:r>
+              <a:rPr lang="de-DE" dirty="0" err="1"/>
+              <a:t>have</a:t>
+            </a:r>
+            <a:r>
+              <a:rPr lang="de-DE" dirty="0"/>
+              <a:t> a high </a:t>
+            </a:r>
+            <a:r>
+              <a:rPr lang="de-DE" dirty="0" err="1"/>
+              <a:t>degree</a:t>
+            </a:r>
+            <a:r>
+              <a:rPr lang="de-DE" dirty="0"/>
+              <a:t> </a:t>
+            </a:r>
+            <a:r>
+              <a:rPr lang="de-DE" dirty="0" err="1"/>
+              <a:t>of</a:t>
+            </a:r>
+            <a:r>
+              <a:rPr lang="de-DE" dirty="0"/>
+              <a:t> </a:t>
+            </a:r>
+            <a:r>
+              <a:rPr lang="de-DE" dirty="0" err="1"/>
+              <a:t>user</a:t>
+            </a:r>
+            <a:r>
+              <a:rPr lang="de-DE" dirty="0"/>
+              <a:t> </a:t>
+            </a:r>
+            <a:r>
+              <a:rPr lang="de-DE" dirty="0" err="1"/>
+              <a:t>interaction</a:t>
+            </a:r>
+            <a:r>
+              <a:rPr lang="de-DE" dirty="0"/>
+              <a:t>, </a:t>
+            </a:r>
+            <a:r>
+              <a:rPr lang="de-DE" dirty="0" err="1"/>
+              <a:t>always</a:t>
+            </a:r>
+            <a:r>
+              <a:rPr lang="de-DE" dirty="0"/>
+              <a:t> </a:t>
+            </a:r>
+            <a:r>
+              <a:rPr lang="de-DE" dirty="0" err="1"/>
+              <a:t>querying</a:t>
+            </a:r>
+            <a:r>
+              <a:rPr lang="de-DE" dirty="0"/>
+              <a:t> </a:t>
+            </a:r>
+            <a:r>
+              <a:rPr lang="de-DE" dirty="0" err="1"/>
+              <a:t>the</a:t>
+            </a:r>
+            <a:r>
+              <a:rPr lang="de-DE" dirty="0"/>
+              <a:t> </a:t>
+            </a:r>
+            <a:r>
+              <a:rPr lang="de-DE" dirty="0" err="1"/>
+              <a:t>server</a:t>
+            </a:r>
+            <a:r>
+              <a:rPr lang="de-DE" dirty="0"/>
+              <a:t> </a:t>
             </a:r>
             <a:r>
               <a:rPr lang="de-DE" dirty="0" err="1"/>
@@ -992,19 +918,11 @@
             </a:r>
             <a:r>
               <a:rPr lang="de-DE" dirty="0"/>
-              <a:t> </a:t>
+              <a:t> a </a:t>
             </a:r>
             <a:r>
               <a:rPr lang="de-DE" dirty="0" err="1"/>
-              <a:t>the</a:t>
-            </a:r>
-            <a:r>
-              <a:rPr lang="de-DE" dirty="0"/>
-              <a:t> Notes-App-demo </a:t>
-            </a:r>
-            <a:r>
-              <a:rPr lang="de-DE" dirty="0" err="1"/>
-              <a:t>by</a:t>
+              <a:t>bad</a:t>
             </a:r>
             <a:r>
               <a:rPr lang="de-DE" dirty="0"/>
@@ -1012,55 +930,7 @@
             </a:r>
             <a:r>
               <a:rPr lang="de-DE" dirty="0" err="1"/>
-              <a:t>the</a:t>
-            </a:r>
-            <a:r>
-              <a:rPr lang="de-DE" dirty="0"/>
-              <a:t> </a:t>
-            </a:r>
-            <a:r>
-              <a:rPr lang="de-DE" dirty="0" err="1"/>
-              <a:t>team</a:t>
-            </a:r>
-            <a:r>
-              <a:rPr lang="de-DE" dirty="0"/>
-              <a:t> at Facebook, </a:t>
-            </a:r>
-            <a:r>
-              <a:rPr lang="de-DE" dirty="0" err="1"/>
-              <a:t>which</a:t>
-            </a:r>
-            <a:r>
-              <a:rPr lang="de-DE" dirty="0"/>
-              <a:t> </a:t>
-            </a:r>
-            <a:r>
-              <a:rPr lang="de-DE" dirty="0" err="1"/>
-              <a:t>we</a:t>
-            </a:r>
-            <a:r>
-              <a:rPr lang="de-DE" dirty="0"/>
-              <a:t> </a:t>
-            </a:r>
-            <a:r>
-              <a:rPr lang="de-DE" dirty="0" err="1"/>
-              <a:t>migrated</a:t>
-            </a:r>
-            <a:r>
-              <a:rPr lang="de-DE" dirty="0"/>
-              <a:t> </a:t>
-            </a:r>
-            <a:r>
-              <a:rPr lang="de-DE" dirty="0" err="1"/>
-              <a:t>to</a:t>
-            </a:r>
-            <a:r>
-              <a:rPr lang="de-DE" dirty="0"/>
-              <a:t> </a:t>
-            </a:r>
-            <a:r>
-              <a:rPr lang="de-DE" dirty="0" err="1"/>
-              <a:t>TypeScript</a:t>
+              <a:t>idea</a:t>
             </a:r>
             <a:r>
               <a:rPr lang="de-DE" dirty="0"/>
@@ -1086,7 +956,7 @@
           <a:p>
             <a:fld id="{AEAFCDA7-1A8B-6E40-88EB-952C2E72DED4}" type="slidenum">
               <a:rPr lang="de-DE" smtClean="0"/>
-              <a:t>15</a:t>
+              <a:t>11</a:t>
             </a:fld>
             <a:endParaRPr lang="de-DE"/>
           </a:p>
@@ -1095,7 +965,7 @@
     </p:spTree>
     <p:extLst>
       <p:ext uri="{BB962C8B-B14F-4D97-AF65-F5344CB8AC3E}">
-        <p14:creationId xmlns:p14="http://schemas.microsoft.com/office/powerpoint/2010/main" val="3855555035"/>
+        <p14:creationId xmlns:p14="http://schemas.microsoft.com/office/powerpoint/2010/main" val="3636783220"/>
       </p:ext>
     </p:extLst>
   </p:cSld>
@@ -1149,85 +1019,9 @@
           <a:bodyPr/>
           <a:lstStyle/>
           <a:p>
-            <a:pPr marL="171450" indent="-171450">
-              <a:buFontTx/>
-              <a:buChar char="-"/>
-            </a:pPr>
-            <a:r>
-              <a:rPr lang="en-GB" noProof="0" dirty="0"/>
-              <a:t>User navigates localhost:3000.</a:t>
-            </a:r>
-          </a:p>
-          <a:p>
-            <a:pPr marL="171450" indent="-171450">
-              <a:buFontTx/>
-              <a:buChar char="-"/>
-            </a:pPr>
-            <a:r>
-              <a:rPr lang="en-GB" noProof="0" dirty="0" err="1"/>
-              <a:t>api.server.ts</a:t>
-            </a:r>
-            <a:r>
-              <a:rPr lang="en-GB" noProof="0" dirty="0"/>
-              <a:t> returns </a:t>
-            </a:r>
-            <a:r>
-              <a:rPr lang="en-GB" noProof="0" dirty="0" err="1"/>
-              <a:t>index.html</a:t>
-            </a:r>
-            <a:r>
-              <a:rPr lang="en-GB" noProof="0" dirty="0"/>
-              <a:t> and </a:t>
-            </a:r>
-            <a:r>
-              <a:rPr lang="en-GB" noProof="0" dirty="0" err="1"/>
-              <a:t>Root.client.tsx</a:t>
-            </a:r>
-            <a:r>
-              <a:rPr lang="en-GB" noProof="0" dirty="0"/>
-              <a:t> component is rendered.</a:t>
-            </a:r>
-          </a:p>
-          <a:p>
-            <a:pPr marL="171450" indent="-171450">
-              <a:buFontTx/>
-              <a:buChar char="-"/>
-            </a:pPr>
-            <a:r>
-              <a:rPr lang="en-GB" noProof="0" dirty="0" err="1"/>
-              <a:t>Root.client.tsx</a:t>
-            </a:r>
-            <a:r>
-              <a:rPr lang="en-GB" noProof="0" dirty="0"/>
-              <a:t> triggers initial server component render by querying a certain URL using a location object that represents the current app state (navigation etc).</a:t>
-            </a:r>
-          </a:p>
-          <a:p>
-            <a:pPr marL="171450" indent="-171450">
-              <a:buFontTx/>
-              <a:buChar char="-"/>
-            </a:pPr>
-            <a:r>
-              <a:rPr lang="en-GB" noProof="0" dirty="0"/>
-              <a:t>Server components get rendered on the server, native HTML and Client components are sent to the client using a certain </a:t>
-            </a:r>
-            <a:r>
-              <a:rPr lang="en-GB" noProof="0" dirty="0" err="1"/>
-              <a:t>streamable</a:t>
-            </a:r>
-            <a:r>
-              <a:rPr lang="en-GB" noProof="0" dirty="0"/>
-              <a:t> format.</a:t>
-            </a:r>
-          </a:p>
-          <a:p>
-            <a:pPr marL="171450" indent="-171450">
-              <a:buFontTx/>
-              <a:buChar char="-"/>
-            </a:pPr>
-            <a:r>
-              <a:rPr lang="en-GB" noProof="0" dirty="0"/>
-              <a:t>Client components are rendered on the client. Updates from the server are streamed in order to update the view.</a:t>
+            <a:r>
+              <a:rPr lang="de-DE" dirty="0"/>
+              <a:t>Felix</a:t>
             </a:r>
           </a:p>
         </p:txBody>
@@ -1249,7 +1043,7 @@
           <a:p>
             <a:fld id="{AEAFCDA7-1A8B-6E40-88EB-952C2E72DED4}" type="slidenum">
               <a:rPr lang="de-DE" smtClean="0"/>
-              <a:t>16</a:t>
+              <a:t>12</a:t>
             </a:fld>
             <a:endParaRPr lang="de-DE"/>
           </a:p>
@@ -1258,7 +1052,7 @@
     </p:spTree>
     <p:extLst>
       <p:ext uri="{BB962C8B-B14F-4D97-AF65-F5344CB8AC3E}">
-        <p14:creationId xmlns:p14="http://schemas.microsoft.com/office/powerpoint/2010/main" val="446493743"/>
+        <p14:creationId xmlns:p14="http://schemas.microsoft.com/office/powerpoint/2010/main" val="1591128301"/>
       </p:ext>
     </p:extLst>
   </p:cSld>
@@ -1312,68 +1106,192 @@
           <a:bodyPr/>
           <a:lstStyle/>
           <a:p>
-            <a:pPr marL="171450" indent="-171450">
-              <a:buFontTx/>
-              <a:buChar char="-"/>
-            </a:pPr>
-            <a:r>
-              <a:rPr lang="en-GB" noProof="0" dirty="0"/>
-              <a:t>The whole component tree gets </a:t>
-            </a:r>
-            <a:r>
-              <a:rPr lang="en-GB" noProof="0" dirty="0" err="1"/>
-              <a:t>rerendered</a:t>
-            </a:r>
-            <a:endParaRPr lang="en-GB" noProof="0" dirty="0"/>
-          </a:p>
-          <a:p>
-            <a:pPr marL="171450" indent="-171450">
-              <a:buFontTx/>
-              <a:buChar char="-"/>
-            </a:pPr>
-            <a:r>
-              <a:rPr lang="en-GB" noProof="0" dirty="0"/>
-              <a:t>Client state is *not* impacted!</a:t>
-            </a:r>
-          </a:p>
-          <a:p>
-            <a:pPr marL="171450" indent="-171450">
-              <a:buFontTx/>
-              <a:buChar char="-"/>
-            </a:pPr>
-            <a:r>
-              <a:rPr lang="en-GB" noProof="0" dirty="0" err="1"/>
-              <a:t>readRoot</a:t>
-            </a:r>
-            <a:r>
-              <a:rPr lang="en-GB" noProof="0" dirty="0"/>
-              <a:t>() is a function provided by a webpack plugin (react-server-</a:t>
-            </a:r>
-            <a:r>
-              <a:rPr lang="en-GB" noProof="0" dirty="0" err="1"/>
-              <a:t>dom</a:t>
-            </a:r>
-            <a:r>
-              <a:rPr lang="en-GB" noProof="0" dirty="0"/>
-              <a:t>-webpack). It is able to parse the </a:t>
-            </a:r>
-            <a:r>
-              <a:rPr lang="en-GB" noProof="0" dirty="0" err="1"/>
-              <a:t>streamable</a:t>
-            </a:r>
-            <a:r>
-              <a:rPr lang="en-GB" noProof="0" dirty="0"/>
-              <a:t> format and trigger React rendering on the client side.</a:t>
-            </a:r>
-          </a:p>
-          <a:p>
-            <a:pPr marL="171450" indent="-171450">
-              <a:buFontTx/>
-              <a:buChar char="-"/>
-            </a:pPr>
-            <a:r>
-              <a:rPr lang="en-GB" noProof="0" dirty="0"/>
-              <a:t>Question: Any idea, why caching was implemented at that point?</a:t>
+            <a:r>
+              <a:rPr lang="de-DE" dirty="0"/>
+              <a:t>Felix</a:t>
+            </a:r>
+          </a:p>
+          <a:p>
+            <a:endParaRPr lang="de-DE" dirty="0"/>
+          </a:p>
+          <a:p>
+            <a:r>
+              <a:rPr lang="de-DE" dirty="0"/>
+              <a:t>- </a:t>
+            </a:r>
+            <a:r>
+              <a:rPr lang="de-DE" dirty="0" err="1"/>
+              <a:t>We´ve</a:t>
+            </a:r>
+            <a:r>
+              <a:rPr lang="de-DE" dirty="0"/>
+              <a:t> </a:t>
+            </a:r>
+            <a:r>
+              <a:rPr lang="de-DE" dirty="0" err="1"/>
+              <a:t>already</a:t>
+            </a:r>
+            <a:r>
+              <a:rPr lang="de-DE" dirty="0"/>
+              <a:t> </a:t>
+            </a:r>
+            <a:r>
+              <a:rPr lang="de-DE" dirty="0" err="1"/>
+              <a:t>talked</a:t>
+            </a:r>
+            <a:r>
+              <a:rPr lang="de-DE" dirty="0"/>
+              <a:t> </a:t>
+            </a:r>
+            <a:r>
+              <a:rPr lang="de-DE" dirty="0" err="1"/>
+              <a:t>about</a:t>
+            </a:r>
+            <a:r>
+              <a:rPr lang="de-DE" dirty="0"/>
+              <a:t> </a:t>
+            </a:r>
+            <a:r>
+              <a:rPr lang="de-DE" dirty="0" err="1"/>
+              <a:t>direct</a:t>
+            </a:r>
+            <a:r>
+              <a:rPr lang="de-DE" dirty="0"/>
+              <a:t> </a:t>
+            </a:r>
+            <a:r>
+              <a:rPr lang="de-DE" dirty="0" err="1"/>
+              <a:t>server</a:t>
+            </a:r>
+            <a:r>
+              <a:rPr lang="de-DE" dirty="0"/>
+              <a:t> </a:t>
+            </a:r>
+            <a:r>
+              <a:rPr lang="de-DE" dirty="0" err="1"/>
+              <a:t>access</a:t>
+            </a:r>
+            <a:r>
+              <a:rPr lang="de-DE" dirty="0"/>
+              <a:t> </a:t>
+            </a:r>
+            <a:r>
+              <a:rPr lang="de-DE" dirty="0" err="1"/>
+              <a:t>as</a:t>
+            </a:r>
+            <a:r>
+              <a:rPr lang="de-DE" dirty="0"/>
+              <a:t> </a:t>
+            </a:r>
+            <a:r>
+              <a:rPr lang="de-DE" dirty="0" err="1"/>
+              <a:t>well</a:t>
+            </a:r>
+            <a:r>
+              <a:rPr lang="de-DE" dirty="0"/>
+              <a:t> </a:t>
+            </a:r>
+            <a:r>
+              <a:rPr lang="de-DE" dirty="0" err="1"/>
+              <a:t>as</a:t>
+            </a:r>
+            <a:r>
+              <a:rPr lang="de-DE" dirty="0"/>
+              <a:t> </a:t>
+            </a:r>
+            <a:r>
+              <a:rPr lang="de-DE" dirty="0" err="1"/>
+              <a:t>the</a:t>
+            </a:r>
+            <a:r>
+              <a:rPr lang="de-DE" dirty="0"/>
+              <a:t> client-server </a:t>
+            </a:r>
+            <a:r>
+              <a:rPr lang="de-DE" dirty="0" err="1"/>
+              <a:t>waterfall</a:t>
+            </a:r>
+            <a:r>
+              <a:rPr lang="de-DE" dirty="0"/>
+              <a:t> </a:t>
+            </a:r>
+            <a:r>
+              <a:rPr lang="de-DE" dirty="0" err="1"/>
+              <a:t>issue</a:t>
+            </a:r>
+            <a:r>
+              <a:rPr lang="de-DE" dirty="0"/>
+              <a:t>.</a:t>
+            </a:r>
+          </a:p>
+          <a:p>
+            <a:r>
+              <a:rPr lang="de-DE" dirty="0"/>
+              <a:t>- Server </a:t>
+            </a:r>
+            <a:r>
+              <a:rPr lang="de-DE" dirty="0" err="1"/>
+              <a:t>components</a:t>
+            </a:r>
+            <a:r>
+              <a:rPr lang="de-DE" dirty="0"/>
+              <a:t> </a:t>
+            </a:r>
+            <a:r>
+              <a:rPr lang="de-DE" dirty="0" err="1"/>
+              <a:t>are</a:t>
+            </a:r>
+            <a:r>
+              <a:rPr lang="de-DE" dirty="0"/>
+              <a:t> </a:t>
+            </a:r>
+            <a:r>
+              <a:rPr lang="de-DE" dirty="0" err="1"/>
+              <a:t>rendered</a:t>
+            </a:r>
+            <a:r>
+              <a:rPr lang="de-DE" dirty="0"/>
+              <a:t> </a:t>
+            </a:r>
+            <a:r>
+              <a:rPr lang="de-DE" dirty="0" err="1"/>
+              <a:t>to</a:t>
+            </a:r>
+            <a:r>
+              <a:rPr lang="de-DE" dirty="0"/>
+              <a:t> native HTML </a:t>
+            </a:r>
+            <a:r>
+              <a:rPr lang="de-DE" dirty="0" err="1"/>
+              <a:t>elements</a:t>
+            </a:r>
+            <a:r>
+              <a:rPr lang="de-DE" dirty="0"/>
+              <a:t> </a:t>
+            </a:r>
+            <a:r>
+              <a:rPr lang="de-DE" dirty="0" err="1"/>
+              <a:t>or</a:t>
+            </a:r>
+            <a:r>
+              <a:rPr lang="de-DE" dirty="0"/>
+              <a:t> </a:t>
+            </a:r>
+            <a:r>
+              <a:rPr lang="de-DE" dirty="0" err="1"/>
+              <a:t>client</a:t>
+            </a:r>
+            <a:r>
+              <a:rPr lang="de-DE" dirty="0"/>
+              <a:t> </a:t>
+            </a:r>
+            <a:r>
+              <a:rPr lang="de-DE" dirty="0" err="1"/>
+              <a:t>components</a:t>
+            </a:r>
+            <a:r>
+              <a:rPr lang="de-DE" dirty="0"/>
+              <a:t>.</a:t>
             </a:r>
           </a:p>
         </p:txBody>
@@ -1395,7 +1313,7 @@
           <a:p>
             <a:fld id="{AEAFCDA7-1A8B-6E40-88EB-952C2E72DED4}" type="slidenum">
               <a:rPr lang="de-DE" smtClean="0"/>
-              <a:t>17</a:t>
+              <a:t>13</a:t>
             </a:fld>
             <a:endParaRPr lang="de-DE"/>
           </a:p>
@@ -1404,7 +1322,7 @@
     </p:spTree>
     <p:extLst>
       <p:ext uri="{BB962C8B-B14F-4D97-AF65-F5344CB8AC3E}">
-        <p14:creationId xmlns:p14="http://schemas.microsoft.com/office/powerpoint/2010/main" val="3946219664"/>
+        <p14:creationId xmlns:p14="http://schemas.microsoft.com/office/powerpoint/2010/main" val="980616402"/>
       </p:ext>
     </p:extLst>
   </p:cSld>
@@ -1463,8 +1381,8 @@
               <a:buChar char="-"/>
             </a:pPr>
             <a:r>
-              <a:rPr lang="en-GB" noProof="0" dirty="0"/>
-              <a:t>Lets go through some parts of the app</a:t>
+              <a:rPr lang="de-DE" dirty="0"/>
+              <a:t>Felix</a:t>
             </a:r>
           </a:p>
           <a:p>
@@ -1472,22 +1390,14 @@
               <a:buFontTx/>
               <a:buChar char="-"/>
             </a:pPr>
-            <a:r>
-              <a:rPr lang="en-GB" noProof="0" dirty="0" err="1"/>
-              <a:t>App.server.tsx</a:t>
-            </a:r>
-            <a:endParaRPr lang="en-GB" noProof="0" dirty="0"/>
+            <a:endParaRPr lang="de-DE" dirty="0"/>
           </a:p>
           <a:p>
             <a:pPr marL="171450" indent="-171450">
               <a:buFontTx/>
               <a:buChar char="-"/>
             </a:pPr>
-            <a:r>
-              <a:rPr lang="en-GB" noProof="0" dirty="0" err="1"/>
-              <a:t>NoteList.server.tsx</a:t>
-            </a:r>
-            <a:endParaRPr lang="en-GB" noProof="0" dirty="0"/>
+            <a:endParaRPr lang="de-DE" dirty="0"/>
           </a:p>
           <a:p>
             <a:pPr marL="171450" indent="-171450">
@@ -1495,10 +1405,197 @@
               <a:buChar char="-"/>
             </a:pPr>
             <a:r>
-              <a:rPr lang="en-GB" noProof="0" dirty="0" err="1"/>
-              <a:t>SidebarNote.tsx</a:t>
-            </a:r>
-            <a:endParaRPr lang="en-GB" noProof="0" dirty="0"/>
+              <a:rPr lang="de-DE" dirty="0" err="1"/>
+              <a:t>If</a:t>
+            </a:r>
+            <a:r>
+              <a:rPr lang="de-DE" dirty="0"/>
+              <a:t> </a:t>
+            </a:r>
+            <a:r>
+              <a:rPr lang="de-DE" dirty="0" err="1"/>
+              <a:t>this</a:t>
+            </a:r>
+            <a:r>
+              <a:rPr lang="de-DE" dirty="0"/>
+              <a:t> </a:t>
+            </a:r>
+            <a:r>
+              <a:rPr lang="de-DE" dirty="0" err="1"/>
+              <a:t>is</a:t>
+            </a:r>
+            <a:r>
+              <a:rPr lang="de-DE" dirty="0"/>
+              <a:t> </a:t>
+            </a:r>
+            <a:r>
+              <a:rPr lang="de-DE" dirty="0" err="1"/>
+              <a:t>done</a:t>
+            </a:r>
+            <a:r>
+              <a:rPr lang="de-DE" dirty="0"/>
+              <a:t> </a:t>
+            </a:r>
+            <a:r>
+              <a:rPr lang="de-DE" dirty="0" err="1"/>
+              <a:t>within</a:t>
+            </a:r>
+            <a:r>
+              <a:rPr lang="de-DE" dirty="0"/>
+              <a:t> a </a:t>
+            </a:r>
+            <a:r>
+              <a:rPr lang="de-DE" dirty="0" err="1"/>
+              <a:t>server</a:t>
+            </a:r>
+            <a:r>
+              <a:rPr lang="de-DE" dirty="0"/>
+              <a:t> </a:t>
+            </a:r>
+            <a:r>
+              <a:rPr lang="de-DE" dirty="0" err="1"/>
+              <a:t>component</a:t>
+            </a:r>
+            <a:r>
+              <a:rPr lang="de-DE" dirty="0"/>
+              <a:t> </a:t>
+            </a:r>
+            <a:r>
+              <a:rPr lang="de-DE" dirty="0" err="1"/>
+              <a:t>or</a:t>
+            </a:r>
+            <a:r>
+              <a:rPr lang="de-DE" dirty="0"/>
+              <a:t> a </a:t>
+            </a:r>
+            <a:r>
+              <a:rPr lang="de-DE" dirty="0" err="1"/>
+              <a:t>shared</a:t>
+            </a:r>
+            <a:r>
+              <a:rPr lang="de-DE" dirty="0"/>
+              <a:t> </a:t>
+            </a:r>
+            <a:r>
+              <a:rPr lang="de-DE" dirty="0" err="1"/>
+              <a:t>component</a:t>
+            </a:r>
+            <a:r>
+              <a:rPr lang="de-DE" dirty="0"/>
+              <a:t> </a:t>
+            </a:r>
+            <a:r>
+              <a:rPr lang="de-DE" dirty="0" err="1"/>
+              <a:t>running</a:t>
+            </a:r>
+            <a:r>
+              <a:rPr lang="de-DE" dirty="0"/>
+              <a:t> on </a:t>
+            </a:r>
+            <a:r>
+              <a:rPr lang="de-DE" dirty="0" err="1"/>
+              <a:t>the</a:t>
+            </a:r>
+            <a:r>
+              <a:rPr lang="de-DE" dirty="0"/>
+              <a:t> </a:t>
+            </a:r>
+            <a:r>
+              <a:rPr lang="de-DE" dirty="0" err="1"/>
+              <a:t>server</a:t>
+            </a:r>
+            <a:r>
+              <a:rPr lang="de-DE" dirty="0"/>
+              <a:t>, </a:t>
+            </a:r>
+            <a:r>
+              <a:rPr lang="de-DE" dirty="0" err="1"/>
+              <a:t>the</a:t>
+            </a:r>
+            <a:r>
+              <a:rPr lang="de-DE" dirty="0"/>
+              <a:t> </a:t>
+            </a:r>
+            <a:r>
+              <a:rPr lang="de-DE" dirty="0" err="1"/>
+              <a:t>code</a:t>
+            </a:r>
+            <a:r>
+              <a:rPr lang="de-DE" dirty="0"/>
+              <a:t> </a:t>
+            </a:r>
+            <a:r>
+              <a:rPr lang="de-DE" dirty="0" err="1"/>
+              <a:t>of</a:t>
+            </a:r>
+            <a:r>
+              <a:rPr lang="de-DE" dirty="0"/>
+              <a:t> </a:t>
+            </a:r>
+            <a:r>
+              <a:rPr lang="de-DE" dirty="0" err="1"/>
+              <a:t>only</a:t>
+            </a:r>
+            <a:r>
+              <a:rPr lang="de-DE" dirty="0"/>
+              <a:t> </a:t>
+            </a:r>
+            <a:r>
+              <a:rPr lang="de-DE" dirty="0" err="1"/>
+              <a:t>one</a:t>
+            </a:r>
+            <a:r>
+              <a:rPr lang="de-DE" dirty="0"/>
+              <a:t> </a:t>
+            </a:r>
+            <a:r>
+              <a:rPr lang="de-DE" dirty="0" err="1"/>
+              <a:t>component</a:t>
+            </a:r>
+            <a:r>
+              <a:rPr lang="de-DE" dirty="0"/>
+              <a:t> </a:t>
+            </a:r>
+            <a:r>
+              <a:rPr lang="de-DE" dirty="0" err="1"/>
+              <a:t>is</a:t>
+            </a:r>
+            <a:r>
+              <a:rPr lang="de-DE" dirty="0"/>
+              <a:t> </a:t>
+            </a:r>
+            <a:r>
+              <a:rPr lang="de-DE" dirty="0" err="1"/>
+              <a:t>sent</a:t>
+            </a:r>
+            <a:r>
+              <a:rPr lang="de-DE" dirty="0"/>
+              <a:t> </a:t>
+            </a:r>
+            <a:r>
+              <a:rPr lang="de-DE" dirty="0" err="1"/>
+              <a:t>to</a:t>
+            </a:r>
+            <a:r>
+              <a:rPr lang="de-DE" dirty="0"/>
+              <a:t> </a:t>
+            </a:r>
+            <a:r>
+              <a:rPr lang="de-DE" dirty="0" err="1"/>
+              <a:t>the</a:t>
+            </a:r>
+            <a:r>
+              <a:rPr lang="de-DE" dirty="0"/>
+              <a:t> </a:t>
+            </a:r>
+            <a:r>
+              <a:rPr lang="de-DE" dirty="0" err="1"/>
+              <a:t>client</a:t>
+            </a:r>
+            <a:r>
+              <a:rPr lang="de-DE" dirty="0"/>
+              <a:t>.</a:t>
+            </a:r>
           </a:p>
           <a:p>
             <a:pPr marL="171450" indent="-171450">
@@ -1506,85 +1603,37 @@
               <a:buChar char="-"/>
             </a:pPr>
             <a:r>
-              <a:rPr lang="en-GB" noProof="0" dirty="0" err="1"/>
-              <a:t>SidebarNote.client.tsx</a:t>
-            </a:r>
-            <a:endParaRPr lang="en-GB" noProof="0" dirty="0"/>
-          </a:p>
-          <a:p>
-            <a:pPr marL="171450" indent="-171450">
-              <a:buFontTx/>
-              <a:buChar char="-"/>
-            </a:pPr>
-            <a:r>
-              <a:rPr lang="en-GB" noProof="0" dirty="0"/>
-              <a:t>Demonstrate what happens with slow internet!</a:t>
-            </a:r>
-          </a:p>
-          <a:p>
-            <a:pPr marL="171450" indent="-171450">
-              <a:buFontTx/>
-              <a:buChar char="-"/>
-            </a:pPr>
-            <a:r>
-              <a:rPr lang="en-GB" noProof="0" dirty="0"/>
-              <a:t>Don´t forget to say something about </a:t>
-            </a:r>
-            <a:r>
-              <a:rPr lang="en-GB" noProof="0" dirty="0" err="1"/>
-              <a:t>useTransition</a:t>
-            </a:r>
-            <a:r>
-              <a:rPr lang="en-GB" noProof="0" dirty="0"/>
-              <a:t>()</a:t>
-            </a:r>
-          </a:p>
-          <a:p>
-            <a:pPr marL="171450" indent="-171450">
-              <a:buFontTx/>
-              <a:buChar char="-"/>
-            </a:pPr>
-            <a:r>
-              <a:rPr lang="en-GB" noProof="0" dirty="0" err="1"/>
-              <a:t>Note.server.tsx</a:t>
-            </a:r>
-            <a:endParaRPr lang="en-GB" noProof="0" dirty="0"/>
-          </a:p>
-          <a:p>
-            <a:pPr marL="171450" indent="-171450">
-              <a:buFontTx/>
-              <a:buChar char="-"/>
-            </a:pPr>
-            <a:r>
-              <a:rPr lang="en-GB" noProof="0" dirty="0" err="1"/>
-              <a:t>NoteEditor.client.tsx</a:t>
-            </a:r>
-            <a:endParaRPr lang="en-GB" noProof="0" dirty="0"/>
-          </a:p>
-          <a:p>
-            <a:pPr marL="171450" indent="-171450">
-              <a:buFontTx/>
-              <a:buChar char="-"/>
-            </a:pPr>
-            <a:r>
-              <a:rPr lang="en-GB" noProof="0" dirty="0"/>
-              <a:t>Saving a note, invalidating the cache, </a:t>
-            </a:r>
-            <a:r>
-              <a:rPr lang="en-GB" noProof="0" dirty="0" err="1"/>
-              <a:t>rerender</a:t>
-            </a:r>
-            <a:r>
-              <a:rPr lang="en-GB" noProof="0" dirty="0"/>
-              <a:t> the app, navigate to update app state</a:t>
-            </a:r>
-          </a:p>
-          <a:p>
-            <a:pPr marL="171450" indent="-171450">
-              <a:buFontTx/>
-              <a:buChar char="-"/>
-            </a:pPr>
-            <a:endParaRPr lang="en-GB" noProof="0" dirty="0"/>
+              <a:rPr lang="de-DE" dirty="0" err="1"/>
+              <a:t>No</a:t>
+            </a:r>
+            <a:r>
+              <a:rPr lang="de-DE" dirty="0"/>
+              <a:t> </a:t>
+            </a:r>
+            <a:r>
+              <a:rPr lang="de-DE" dirty="0" err="1"/>
+              <a:t>lazy</a:t>
+            </a:r>
+            <a:r>
+              <a:rPr lang="de-DE" dirty="0"/>
+              <a:t> </a:t>
+            </a:r>
+            <a:r>
+              <a:rPr lang="de-DE" dirty="0" err="1"/>
+              <a:t>loading</a:t>
+            </a:r>
+            <a:r>
+              <a:rPr lang="de-DE" dirty="0"/>
+              <a:t> </a:t>
+            </a:r>
+            <a:r>
+              <a:rPr lang="de-DE" dirty="0" err="1"/>
+              <a:t>required</a:t>
+            </a:r>
+            <a:r>
+              <a:rPr lang="de-DE" dirty="0"/>
+              <a:t>.</a:t>
+            </a:r>
           </a:p>
         </p:txBody>
       </p:sp>
@@ -1605,7 +1654,7 @@
           <a:p>
             <a:fld id="{AEAFCDA7-1A8B-6E40-88EB-952C2E72DED4}" type="slidenum">
               <a:rPr lang="de-DE" smtClean="0"/>
-              <a:t>18</a:t>
+              <a:t>14</a:t>
             </a:fld>
             <a:endParaRPr lang="de-DE"/>
           </a:p>
@@ -1614,7 +1663,7 @@
     </p:spTree>
     <p:extLst>
       <p:ext uri="{BB962C8B-B14F-4D97-AF65-F5344CB8AC3E}">
-        <p14:creationId xmlns:p14="http://schemas.microsoft.com/office/powerpoint/2010/main" val="2292729554"/>
+        <p14:creationId xmlns:p14="http://schemas.microsoft.com/office/powerpoint/2010/main" val="68261809"/>
       </p:ext>
     </p:extLst>
   </p:cSld>
@@ -1668,7 +1717,157 @@
           <a:bodyPr/>
           <a:lstStyle/>
           <a:p>
+            <a:pPr marL="171450" indent="-171450">
+              <a:buFontTx/>
+              <a:buChar char="-"/>
+            </a:pPr>
+            <a:r>
+              <a:rPr lang="de-DE" dirty="0"/>
+              <a:t>Alex</a:t>
+            </a:r>
+          </a:p>
+          <a:p>
+            <a:pPr marL="171450" indent="-171450">
+              <a:buFontTx/>
+              <a:buChar char="-"/>
+            </a:pPr>
             <a:endParaRPr lang="de-DE" dirty="0"/>
+          </a:p>
+          <a:p>
+            <a:pPr marL="171450" indent="-171450">
+              <a:buFontTx/>
+              <a:buChar char="-"/>
+            </a:pPr>
+            <a:r>
+              <a:rPr lang="de-DE" dirty="0" err="1"/>
+              <a:t>Let´s</a:t>
+            </a:r>
+            <a:r>
+              <a:rPr lang="de-DE" dirty="0"/>
+              <a:t> </a:t>
+            </a:r>
+            <a:r>
+              <a:rPr lang="de-DE" dirty="0" err="1"/>
+              <a:t>dive</a:t>
+            </a:r>
+            <a:r>
+              <a:rPr lang="de-DE" dirty="0"/>
+              <a:t> </a:t>
+            </a:r>
+            <a:r>
+              <a:rPr lang="de-DE" dirty="0" err="1"/>
+              <a:t>into</a:t>
+            </a:r>
+            <a:r>
+              <a:rPr lang="de-DE" dirty="0"/>
+              <a:t> </a:t>
+            </a:r>
+            <a:r>
+              <a:rPr lang="de-DE" dirty="0" err="1"/>
+              <a:t>the</a:t>
+            </a:r>
+            <a:r>
+              <a:rPr lang="de-DE" dirty="0"/>
+              <a:t> </a:t>
+            </a:r>
+            <a:r>
+              <a:rPr lang="de-DE" dirty="0" err="1"/>
+              <a:t>demo</a:t>
+            </a:r>
+            <a:r>
+              <a:rPr lang="de-DE" dirty="0"/>
+              <a:t>.</a:t>
+            </a:r>
+          </a:p>
+          <a:p>
+            <a:pPr marL="171450" indent="-171450">
+              <a:buFontTx/>
+              <a:buChar char="-"/>
+            </a:pPr>
+            <a:r>
+              <a:rPr lang="de-DE" dirty="0"/>
+              <a:t>This </a:t>
+            </a:r>
+            <a:r>
+              <a:rPr lang="de-DE" dirty="0" err="1"/>
+              <a:t>is</a:t>
+            </a:r>
+            <a:r>
+              <a:rPr lang="de-DE" dirty="0"/>
+              <a:t> </a:t>
+            </a:r>
+            <a:r>
+              <a:rPr lang="de-DE" dirty="0" err="1"/>
+              <a:t>the</a:t>
+            </a:r>
+            <a:r>
+              <a:rPr lang="de-DE" dirty="0"/>
+              <a:t> Notes-App-demo </a:t>
+            </a:r>
+            <a:r>
+              <a:rPr lang="de-DE" dirty="0" err="1"/>
+              <a:t>by</a:t>
+            </a:r>
+            <a:r>
+              <a:rPr lang="de-DE" dirty="0"/>
+              <a:t> </a:t>
+            </a:r>
+            <a:r>
+              <a:rPr lang="de-DE" dirty="0" err="1"/>
+              <a:t>the</a:t>
+            </a:r>
+            <a:r>
+              <a:rPr lang="de-DE" dirty="0"/>
+              <a:t> </a:t>
+            </a:r>
+            <a:r>
+              <a:rPr lang="de-DE" dirty="0" err="1"/>
+              <a:t>team</a:t>
+            </a:r>
+            <a:r>
+              <a:rPr lang="de-DE" dirty="0"/>
+              <a:t> at Facebook, </a:t>
+            </a:r>
+            <a:r>
+              <a:rPr lang="de-DE" dirty="0" err="1"/>
+              <a:t>which</a:t>
+            </a:r>
+            <a:r>
+              <a:rPr lang="de-DE" dirty="0"/>
+              <a:t> </a:t>
+            </a:r>
+            <a:r>
+              <a:rPr lang="de-DE" dirty="0" err="1"/>
+              <a:t>we</a:t>
+            </a:r>
+            <a:r>
+              <a:rPr lang="de-DE" dirty="0"/>
+              <a:t> </a:t>
+            </a:r>
+            <a:r>
+              <a:rPr lang="de-DE" dirty="0" err="1"/>
+              <a:t>migrated</a:t>
+            </a:r>
+            <a:r>
+              <a:rPr lang="de-DE" dirty="0"/>
+              <a:t> </a:t>
+            </a:r>
+            <a:r>
+              <a:rPr lang="de-DE" dirty="0" err="1"/>
+              <a:t>to</a:t>
+            </a:r>
+            <a:r>
+              <a:rPr lang="de-DE" dirty="0"/>
+              <a:t> </a:t>
+            </a:r>
+            <a:r>
+              <a:rPr lang="de-DE" dirty="0" err="1"/>
+              <a:t>TypeScript</a:t>
+            </a:r>
+            <a:r>
+              <a:rPr lang="de-DE" dirty="0"/>
+              <a:t>.</a:t>
+            </a:r>
           </a:p>
         </p:txBody>
       </p:sp>
@@ -1689,7 +1888,7 @@
           <a:p>
             <a:fld id="{AEAFCDA7-1A8B-6E40-88EB-952C2E72DED4}" type="slidenum">
               <a:rPr lang="de-DE" smtClean="0"/>
-              <a:t>19</a:t>
+              <a:t>15</a:t>
             </a:fld>
             <a:endParaRPr lang="de-DE"/>
           </a:p>
@@ -1698,7 +1897,7 @@
     </p:spTree>
     <p:extLst>
       <p:ext uri="{BB962C8B-B14F-4D97-AF65-F5344CB8AC3E}">
-        <p14:creationId xmlns:p14="http://schemas.microsoft.com/office/powerpoint/2010/main" val="2977966301"/>
+        <p14:creationId xmlns:p14="http://schemas.microsoft.com/office/powerpoint/2010/main" val="3855555035"/>
       </p:ext>
     </p:extLst>
   </p:cSld>
@@ -1752,7 +1951,103 @@
           <a:bodyPr/>
           <a:lstStyle/>
           <a:p>
-            <a:endParaRPr lang="de-DE" dirty="0"/>
+            <a:pPr marL="171450" indent="-171450">
+              <a:buFontTx/>
+              <a:buChar char="-"/>
+            </a:pPr>
+            <a:r>
+              <a:rPr lang="en-GB" noProof="0" dirty="0"/>
+              <a:t>Alex</a:t>
+            </a:r>
+          </a:p>
+          <a:p>
+            <a:pPr marL="171450" indent="-171450">
+              <a:buFontTx/>
+              <a:buChar char="-"/>
+            </a:pPr>
+            <a:endParaRPr lang="en-GB" noProof="0" dirty="0"/>
+          </a:p>
+          <a:p>
+            <a:pPr marL="171450" indent="-171450">
+              <a:buFontTx/>
+              <a:buChar char="-"/>
+            </a:pPr>
+            <a:r>
+              <a:rPr lang="en-GB" noProof="0" dirty="0"/>
+              <a:t>User navigates localhost:3000.</a:t>
+            </a:r>
+          </a:p>
+          <a:p>
+            <a:pPr marL="171450" indent="-171450">
+              <a:buFontTx/>
+              <a:buChar char="-"/>
+            </a:pPr>
+            <a:r>
+              <a:rPr lang="en-GB" noProof="0" dirty="0" err="1"/>
+              <a:t>api.server.ts</a:t>
+            </a:r>
+            <a:r>
+              <a:rPr lang="en-GB" noProof="0" dirty="0"/>
+              <a:t> returns </a:t>
+            </a:r>
+            <a:r>
+              <a:rPr lang="en-GB" noProof="0" dirty="0" err="1"/>
+              <a:t>index.html</a:t>
+            </a:r>
+            <a:r>
+              <a:rPr lang="en-GB" noProof="0" dirty="0"/>
+              <a:t> and </a:t>
+            </a:r>
+            <a:r>
+              <a:rPr lang="en-GB" noProof="0" dirty="0" err="1"/>
+              <a:t>Root.client.tsx</a:t>
+            </a:r>
+            <a:r>
+              <a:rPr lang="en-GB" noProof="0" dirty="0"/>
+              <a:t> component is rendered.</a:t>
+            </a:r>
+          </a:p>
+          <a:p>
+            <a:pPr marL="171450" indent="-171450">
+              <a:buFontTx/>
+              <a:buChar char="-"/>
+            </a:pPr>
+            <a:r>
+              <a:rPr lang="en-GB" noProof="0" dirty="0" err="1"/>
+              <a:t>Root.client.tsx</a:t>
+            </a:r>
+            <a:r>
+              <a:rPr lang="en-GB" noProof="0" dirty="0"/>
+              <a:t> triggers initial server component render by querying a certain URL using a location object that represents the current app state (navigation etc).</a:t>
+            </a:r>
+          </a:p>
+          <a:p>
+            <a:pPr marL="171450" indent="-171450">
+              <a:buFontTx/>
+              <a:buChar char="-"/>
+            </a:pPr>
+            <a:r>
+              <a:rPr lang="en-GB" noProof="0" dirty="0"/>
+              <a:t>Server components get rendered on the server, native HTML and Client components are sent to the client using a certain </a:t>
+            </a:r>
+            <a:r>
+              <a:rPr lang="en-GB" noProof="0" dirty="0" err="1"/>
+              <a:t>streamable</a:t>
+            </a:r>
+            <a:r>
+              <a:rPr lang="en-GB" noProof="0" dirty="0"/>
+              <a:t> format.</a:t>
+            </a:r>
+          </a:p>
+          <a:p>
+            <a:pPr marL="171450" indent="-171450">
+              <a:buFontTx/>
+              <a:buChar char="-"/>
+            </a:pPr>
+            <a:r>
+              <a:rPr lang="en-GB" noProof="0" dirty="0"/>
+              <a:t>Client components are rendered on the client. Updates from the server are streamed in order to update the view.</a:t>
+            </a:r>
           </a:p>
         </p:txBody>
       </p:sp>
@@ -1773,7 +2068,7 @@
           <a:p>
             <a:fld id="{AEAFCDA7-1A8B-6E40-88EB-952C2E72DED4}" type="slidenum">
               <a:rPr lang="de-DE" smtClean="0"/>
-              <a:t>24</a:t>
+              <a:t>16</a:t>
             </a:fld>
             <a:endParaRPr lang="de-DE"/>
           </a:p>
@@ -1782,7 +2077,474 @@
     </p:spTree>
     <p:extLst>
       <p:ext uri="{BB962C8B-B14F-4D97-AF65-F5344CB8AC3E}">
-        <p14:creationId xmlns:p14="http://schemas.microsoft.com/office/powerpoint/2010/main" val="4266848986"/>
+        <p14:creationId xmlns:p14="http://schemas.microsoft.com/office/powerpoint/2010/main" val="446493743"/>
+      </p:ext>
+    </p:extLst>
+  </p:cSld>
+  <p:clrMapOvr>
+    <a:masterClrMapping/>
+  </p:clrMapOvr>
+</p:notes>
+</file>
+
+<file path=ppt/notesSlides/notesSlide17.xml><?xml version="1.0" encoding="utf-8"?>
+<p:notes xmlns:a="http://schemas.openxmlformats.org/drawingml/2006/main" xmlns:r="http://schemas.openxmlformats.org/officeDocument/2006/relationships" xmlns:p="http://schemas.openxmlformats.org/presentationml/2006/main">
+  <p:cSld>
+    <p:spTree>
+      <p:nvGrpSpPr>
+        <p:cNvPr id="1" name=""/>
+        <p:cNvGrpSpPr/>
+        <p:nvPr/>
+      </p:nvGrpSpPr>
+      <p:grpSpPr>
+        <a:xfrm>
+          <a:off x="0" y="0"/>
+          <a:ext cx="0" cy="0"/>
+          <a:chOff x="0" y="0"/>
+          <a:chExt cx="0" cy="0"/>
+        </a:xfrm>
+      </p:grpSpPr>
+      <p:sp>
+        <p:nvSpPr>
+          <p:cNvPr id="2" name="Folienbildplatzhalter 1"/>
+          <p:cNvSpPr>
+            <a:spLocks noGrp="1" noRot="1" noChangeAspect="1"/>
+          </p:cNvSpPr>
+          <p:nvPr>
+            <p:ph type="sldImg"/>
+          </p:nvPr>
+        </p:nvSpPr>
+        <p:spPr/>
+      </p:sp>
+      <p:sp>
+        <p:nvSpPr>
+          <p:cNvPr id="3" name="Notizenplatzhalter 2"/>
+          <p:cNvSpPr>
+            <a:spLocks noGrp="1"/>
+          </p:cNvSpPr>
+          <p:nvPr>
+            <p:ph type="body" idx="1"/>
+          </p:nvPr>
+        </p:nvSpPr>
+        <p:spPr/>
+        <p:txBody>
+          <a:bodyPr/>
+          <a:lstStyle/>
+          <a:p>
+            <a:pPr marL="171450" indent="-171450">
+              <a:buFontTx/>
+              <a:buChar char="-"/>
+            </a:pPr>
+            <a:r>
+              <a:rPr lang="en-GB" noProof="0" dirty="0"/>
+              <a:t>Alex</a:t>
+            </a:r>
+          </a:p>
+          <a:p>
+            <a:pPr marL="171450" indent="-171450">
+              <a:buFontTx/>
+              <a:buChar char="-"/>
+            </a:pPr>
+            <a:endParaRPr lang="en-GB" noProof="0" dirty="0"/>
+          </a:p>
+          <a:p>
+            <a:pPr marL="171450" indent="-171450">
+              <a:buFontTx/>
+              <a:buChar char="-"/>
+            </a:pPr>
+            <a:r>
+              <a:rPr lang="en-GB" noProof="0" dirty="0"/>
+              <a:t>The whole component tree gets </a:t>
+            </a:r>
+            <a:r>
+              <a:rPr lang="en-GB" noProof="0" dirty="0" err="1"/>
+              <a:t>rerendered</a:t>
+            </a:r>
+            <a:endParaRPr lang="en-GB" noProof="0" dirty="0"/>
+          </a:p>
+          <a:p>
+            <a:pPr marL="171450" indent="-171450">
+              <a:buFontTx/>
+              <a:buChar char="-"/>
+            </a:pPr>
+            <a:r>
+              <a:rPr lang="en-GB" noProof="0" dirty="0"/>
+              <a:t>Client state is *not* impacted!</a:t>
+            </a:r>
+          </a:p>
+          <a:p>
+            <a:pPr marL="171450" indent="-171450">
+              <a:buFontTx/>
+              <a:buChar char="-"/>
+            </a:pPr>
+            <a:r>
+              <a:rPr lang="en-GB" noProof="0" dirty="0" err="1"/>
+              <a:t>readRoot</a:t>
+            </a:r>
+            <a:r>
+              <a:rPr lang="en-GB" noProof="0" dirty="0"/>
+              <a:t>() is a function provided by a webpack plugin (react-server-</a:t>
+            </a:r>
+            <a:r>
+              <a:rPr lang="en-GB" noProof="0" dirty="0" err="1"/>
+              <a:t>dom</a:t>
+            </a:r>
+            <a:r>
+              <a:rPr lang="en-GB" noProof="0" dirty="0"/>
+              <a:t>-webpack). It is able to parse the </a:t>
+            </a:r>
+            <a:r>
+              <a:rPr lang="en-GB" noProof="0" dirty="0" err="1"/>
+              <a:t>streamable</a:t>
+            </a:r>
+            <a:r>
+              <a:rPr lang="en-GB" noProof="0" dirty="0"/>
+              <a:t> format and trigger React rendering on the client side.</a:t>
+            </a:r>
+          </a:p>
+          <a:p>
+            <a:pPr marL="171450" indent="-171450">
+              <a:buFontTx/>
+              <a:buChar char="-"/>
+            </a:pPr>
+            <a:r>
+              <a:rPr lang="en-GB" noProof="0" dirty="0"/>
+              <a:t>Question: Any idea, why caching was implemented at that point?</a:t>
+            </a:r>
+          </a:p>
+        </p:txBody>
+      </p:sp>
+      <p:sp>
+        <p:nvSpPr>
+          <p:cNvPr id="4" name="Foliennummernplatzhalter 3"/>
+          <p:cNvSpPr>
+            <a:spLocks noGrp="1"/>
+          </p:cNvSpPr>
+          <p:nvPr>
+            <p:ph type="sldNum" sz="quarter" idx="5"/>
+          </p:nvPr>
+        </p:nvSpPr>
+        <p:spPr/>
+        <p:txBody>
+          <a:bodyPr/>
+          <a:lstStyle/>
+          <a:p>
+            <a:fld id="{AEAFCDA7-1A8B-6E40-88EB-952C2E72DED4}" type="slidenum">
+              <a:rPr lang="de-DE" smtClean="0"/>
+              <a:t>17</a:t>
+            </a:fld>
+            <a:endParaRPr lang="de-DE"/>
+          </a:p>
+        </p:txBody>
+      </p:sp>
+    </p:spTree>
+    <p:extLst>
+      <p:ext uri="{BB962C8B-B14F-4D97-AF65-F5344CB8AC3E}">
+        <p14:creationId xmlns:p14="http://schemas.microsoft.com/office/powerpoint/2010/main" val="3946219664"/>
+      </p:ext>
+    </p:extLst>
+  </p:cSld>
+  <p:clrMapOvr>
+    <a:masterClrMapping/>
+  </p:clrMapOvr>
+</p:notes>
+</file>
+
+<file path=ppt/notesSlides/notesSlide18.xml><?xml version="1.0" encoding="utf-8"?>
+<p:notes xmlns:a="http://schemas.openxmlformats.org/drawingml/2006/main" xmlns:r="http://schemas.openxmlformats.org/officeDocument/2006/relationships" xmlns:p="http://schemas.openxmlformats.org/presentationml/2006/main">
+  <p:cSld>
+    <p:spTree>
+      <p:nvGrpSpPr>
+        <p:cNvPr id="1" name=""/>
+        <p:cNvGrpSpPr/>
+        <p:nvPr/>
+      </p:nvGrpSpPr>
+      <p:grpSpPr>
+        <a:xfrm>
+          <a:off x="0" y="0"/>
+          <a:ext cx="0" cy="0"/>
+          <a:chOff x="0" y="0"/>
+          <a:chExt cx="0" cy="0"/>
+        </a:xfrm>
+      </p:grpSpPr>
+      <p:sp>
+        <p:nvSpPr>
+          <p:cNvPr id="2" name="Folienbildplatzhalter 1"/>
+          <p:cNvSpPr>
+            <a:spLocks noGrp="1" noRot="1" noChangeAspect="1"/>
+          </p:cNvSpPr>
+          <p:nvPr>
+            <p:ph type="sldImg"/>
+          </p:nvPr>
+        </p:nvSpPr>
+        <p:spPr/>
+      </p:sp>
+      <p:sp>
+        <p:nvSpPr>
+          <p:cNvPr id="3" name="Notizenplatzhalter 2"/>
+          <p:cNvSpPr>
+            <a:spLocks noGrp="1"/>
+          </p:cNvSpPr>
+          <p:nvPr>
+            <p:ph type="body" idx="1"/>
+          </p:nvPr>
+        </p:nvSpPr>
+        <p:spPr/>
+        <p:txBody>
+          <a:bodyPr/>
+          <a:lstStyle/>
+          <a:p>
+            <a:pPr marL="171450" indent="-171450">
+              <a:buFontTx/>
+              <a:buChar char="-"/>
+            </a:pPr>
+            <a:r>
+              <a:rPr lang="en-GB" noProof="0" dirty="0"/>
+              <a:t>Felix</a:t>
+            </a:r>
+          </a:p>
+          <a:p>
+            <a:pPr marL="171450" indent="-171450">
+              <a:buFontTx/>
+              <a:buChar char="-"/>
+            </a:pPr>
+            <a:r>
+              <a:rPr lang="en-GB" noProof="0" dirty="0"/>
+              <a:t>Lets go through some parts of the app</a:t>
+            </a:r>
+          </a:p>
+          <a:p>
+            <a:pPr marL="171450" indent="-171450">
+              <a:buFontTx/>
+              <a:buChar char="-"/>
+            </a:pPr>
+            <a:r>
+              <a:rPr lang="en-GB" noProof="0" dirty="0" err="1"/>
+              <a:t>App.server.tsx</a:t>
+            </a:r>
+            <a:endParaRPr lang="en-GB" noProof="0" dirty="0"/>
+          </a:p>
+          <a:p>
+            <a:pPr marL="171450" indent="-171450">
+              <a:buFontTx/>
+              <a:buChar char="-"/>
+            </a:pPr>
+            <a:r>
+              <a:rPr lang="en-GB" noProof="0" dirty="0" err="1"/>
+              <a:t>NoteList.server.tsx</a:t>
+            </a:r>
+            <a:endParaRPr lang="en-GB" noProof="0" dirty="0"/>
+          </a:p>
+          <a:p>
+            <a:pPr marL="171450" indent="-171450">
+              <a:buFontTx/>
+              <a:buChar char="-"/>
+            </a:pPr>
+            <a:r>
+              <a:rPr lang="en-GB" noProof="0" dirty="0" err="1"/>
+              <a:t>SidebarNote.tsx</a:t>
+            </a:r>
+            <a:endParaRPr lang="en-GB" noProof="0" dirty="0"/>
+          </a:p>
+          <a:p>
+            <a:pPr marL="171450" indent="-171450">
+              <a:buFontTx/>
+              <a:buChar char="-"/>
+            </a:pPr>
+            <a:r>
+              <a:rPr lang="en-GB" noProof="0" dirty="0" err="1"/>
+              <a:t>SidebarNote.client.tsx</a:t>
+            </a:r>
+            <a:endParaRPr lang="en-GB" noProof="0" dirty="0"/>
+          </a:p>
+          <a:p>
+            <a:pPr marL="171450" indent="-171450">
+              <a:buFontTx/>
+              <a:buChar char="-"/>
+            </a:pPr>
+            <a:r>
+              <a:rPr lang="en-GB" noProof="0" dirty="0"/>
+              <a:t>Demonstrate what happens with slow internet!</a:t>
+            </a:r>
+          </a:p>
+          <a:p>
+            <a:pPr marL="171450" indent="-171450">
+              <a:buFontTx/>
+              <a:buChar char="-"/>
+            </a:pPr>
+            <a:r>
+              <a:rPr lang="en-GB" noProof="0" dirty="0"/>
+              <a:t>Don´t forget to say something about </a:t>
+            </a:r>
+            <a:r>
+              <a:rPr lang="en-GB" noProof="0" dirty="0" err="1"/>
+              <a:t>useTransition</a:t>
+            </a:r>
+            <a:r>
+              <a:rPr lang="en-GB" noProof="0" dirty="0"/>
+              <a:t>()</a:t>
+            </a:r>
+          </a:p>
+          <a:p>
+            <a:pPr marL="171450" indent="-171450">
+              <a:buFontTx/>
+              <a:buChar char="-"/>
+            </a:pPr>
+            <a:r>
+              <a:rPr lang="en-GB" noProof="0" dirty="0" err="1"/>
+              <a:t>Note.server.tsx</a:t>
+            </a:r>
+            <a:endParaRPr lang="en-GB" noProof="0" dirty="0"/>
+          </a:p>
+          <a:p>
+            <a:pPr marL="171450" indent="-171450">
+              <a:buFontTx/>
+              <a:buChar char="-"/>
+            </a:pPr>
+            <a:r>
+              <a:rPr lang="en-GB" noProof="0" dirty="0" err="1"/>
+              <a:t>NoteEditor.client.tsx</a:t>
+            </a:r>
+            <a:endParaRPr lang="en-GB" noProof="0" dirty="0"/>
+          </a:p>
+          <a:p>
+            <a:pPr marL="171450" indent="-171450">
+              <a:buFontTx/>
+              <a:buChar char="-"/>
+            </a:pPr>
+            <a:r>
+              <a:rPr lang="en-GB" noProof="0" dirty="0"/>
+              <a:t>Saving a note, invalidating the cache, </a:t>
+            </a:r>
+            <a:r>
+              <a:rPr lang="en-GB" noProof="0" dirty="0" err="1"/>
+              <a:t>rerender</a:t>
+            </a:r>
+            <a:r>
+              <a:rPr lang="en-GB" noProof="0" dirty="0"/>
+              <a:t> the app, navigate to update app state</a:t>
+            </a:r>
+          </a:p>
+          <a:p>
+            <a:pPr marL="171450" indent="-171450">
+              <a:buFontTx/>
+              <a:buChar char="-"/>
+            </a:pPr>
+            <a:endParaRPr lang="en-GB" noProof="0" dirty="0"/>
+          </a:p>
+        </p:txBody>
+      </p:sp>
+      <p:sp>
+        <p:nvSpPr>
+          <p:cNvPr id="4" name="Foliennummernplatzhalter 3"/>
+          <p:cNvSpPr>
+            <a:spLocks noGrp="1"/>
+          </p:cNvSpPr>
+          <p:nvPr>
+            <p:ph type="sldNum" sz="quarter" idx="5"/>
+          </p:nvPr>
+        </p:nvSpPr>
+        <p:spPr/>
+        <p:txBody>
+          <a:bodyPr/>
+          <a:lstStyle/>
+          <a:p>
+            <a:fld id="{AEAFCDA7-1A8B-6E40-88EB-952C2E72DED4}" type="slidenum">
+              <a:rPr lang="de-DE" smtClean="0"/>
+              <a:t>18</a:t>
+            </a:fld>
+            <a:endParaRPr lang="de-DE"/>
+          </a:p>
+        </p:txBody>
+      </p:sp>
+    </p:spTree>
+    <p:extLst>
+      <p:ext uri="{BB962C8B-B14F-4D97-AF65-F5344CB8AC3E}">
+        <p14:creationId xmlns:p14="http://schemas.microsoft.com/office/powerpoint/2010/main" val="2292729554"/>
+      </p:ext>
+    </p:extLst>
+  </p:cSld>
+  <p:clrMapOvr>
+    <a:masterClrMapping/>
+  </p:clrMapOvr>
+</p:notes>
+</file>
+
+<file path=ppt/notesSlides/notesSlide19.xml><?xml version="1.0" encoding="utf-8"?>
+<p:notes xmlns:a="http://schemas.openxmlformats.org/drawingml/2006/main" xmlns:r="http://schemas.openxmlformats.org/officeDocument/2006/relationships" xmlns:p="http://schemas.openxmlformats.org/presentationml/2006/main">
+  <p:cSld>
+    <p:spTree>
+      <p:nvGrpSpPr>
+        <p:cNvPr id="1" name=""/>
+        <p:cNvGrpSpPr/>
+        <p:nvPr/>
+      </p:nvGrpSpPr>
+      <p:grpSpPr>
+        <a:xfrm>
+          <a:off x="0" y="0"/>
+          <a:ext cx="0" cy="0"/>
+          <a:chOff x="0" y="0"/>
+          <a:chExt cx="0" cy="0"/>
+        </a:xfrm>
+      </p:grpSpPr>
+      <p:sp>
+        <p:nvSpPr>
+          <p:cNvPr id="2" name="Folienbildplatzhalter 1"/>
+          <p:cNvSpPr>
+            <a:spLocks noGrp="1" noRot="1" noChangeAspect="1"/>
+          </p:cNvSpPr>
+          <p:nvPr>
+            <p:ph type="sldImg"/>
+          </p:nvPr>
+        </p:nvSpPr>
+        <p:spPr/>
+      </p:sp>
+      <p:sp>
+        <p:nvSpPr>
+          <p:cNvPr id="3" name="Notizenplatzhalter 2"/>
+          <p:cNvSpPr>
+            <a:spLocks noGrp="1"/>
+          </p:cNvSpPr>
+          <p:nvPr>
+            <p:ph type="body" idx="1"/>
+          </p:nvPr>
+        </p:nvSpPr>
+        <p:spPr/>
+        <p:txBody>
+          <a:bodyPr/>
+          <a:lstStyle/>
+          <a:p>
+            <a:endParaRPr lang="de-DE" dirty="0"/>
+          </a:p>
+        </p:txBody>
+      </p:sp>
+      <p:sp>
+        <p:nvSpPr>
+          <p:cNvPr id="4" name="Foliennummernplatzhalter 3"/>
+          <p:cNvSpPr>
+            <a:spLocks noGrp="1"/>
+          </p:cNvSpPr>
+          <p:nvPr>
+            <p:ph type="sldNum" sz="quarter" idx="5"/>
+          </p:nvPr>
+        </p:nvSpPr>
+        <p:spPr/>
+        <p:txBody>
+          <a:bodyPr/>
+          <a:lstStyle/>
+          <a:p>
+            <a:fld id="{AEAFCDA7-1A8B-6E40-88EB-952C2E72DED4}" type="slidenum">
+              <a:rPr lang="de-DE" smtClean="0"/>
+              <a:t>19</a:t>
+            </a:fld>
+            <a:endParaRPr lang="de-DE"/>
+          </a:p>
+        </p:txBody>
+      </p:sp>
+    </p:spTree>
+    <p:extLst>
+      <p:ext uri="{BB962C8B-B14F-4D97-AF65-F5344CB8AC3E}">
+        <p14:creationId xmlns:p14="http://schemas.microsoft.com/office/powerpoint/2010/main" val="2977966301"/>
       </p:ext>
     </p:extLst>
   </p:cSld>
@@ -1836,7 +2598,10 @@
           <a:bodyPr/>
           <a:lstStyle/>
           <a:p>
-            <a:endParaRPr lang="de-DE" dirty="0"/>
+            <a:r>
+              <a:rPr lang="de-DE" dirty="0"/>
+              <a:t>Felix</a:t>
+            </a:r>
           </a:p>
         </p:txBody>
       </p:sp>
@@ -1857,7 +2622,7 @@
           <a:p>
             <a:fld id="{AEAFCDA7-1A8B-6E40-88EB-952C2E72DED4}" type="slidenum">
               <a:rPr lang="de-DE" smtClean="0"/>
-              <a:t>5</a:t>
+              <a:t>2</a:t>
             </a:fld>
             <a:endParaRPr lang="de-DE"/>
           </a:p>
@@ -1866,7 +2631,178 @@
     </p:spTree>
     <p:extLst>
       <p:ext uri="{BB962C8B-B14F-4D97-AF65-F5344CB8AC3E}">
-        <p14:creationId xmlns:p14="http://schemas.microsoft.com/office/powerpoint/2010/main" val="2375457377"/>
+        <p14:creationId xmlns:p14="http://schemas.microsoft.com/office/powerpoint/2010/main" val="296252648"/>
+      </p:ext>
+    </p:extLst>
+  </p:cSld>
+  <p:clrMapOvr>
+    <a:masterClrMapping/>
+  </p:clrMapOvr>
+</p:notes>
+</file>
+
+<file path=ppt/notesSlides/notesSlide20.xml><?xml version="1.0" encoding="utf-8"?>
+<p:notes xmlns:a="http://schemas.openxmlformats.org/drawingml/2006/main" xmlns:r="http://schemas.openxmlformats.org/officeDocument/2006/relationships" xmlns:p="http://schemas.openxmlformats.org/presentationml/2006/main">
+  <p:cSld>
+    <p:spTree>
+      <p:nvGrpSpPr>
+        <p:cNvPr id="1" name=""/>
+        <p:cNvGrpSpPr/>
+        <p:nvPr/>
+      </p:nvGrpSpPr>
+      <p:grpSpPr>
+        <a:xfrm>
+          <a:off x="0" y="0"/>
+          <a:ext cx="0" cy="0"/>
+          <a:chOff x="0" y="0"/>
+          <a:chExt cx="0" cy="0"/>
+        </a:xfrm>
+      </p:grpSpPr>
+      <p:sp>
+        <p:nvSpPr>
+          <p:cNvPr id="2" name="Slide Image Placeholder 1"/>
+          <p:cNvSpPr>
+            <a:spLocks noGrp="1" noRot="1" noChangeAspect="1"/>
+          </p:cNvSpPr>
+          <p:nvPr>
+            <p:ph type="sldImg"/>
+          </p:nvPr>
+        </p:nvSpPr>
+        <p:spPr/>
+      </p:sp>
+      <p:sp>
+        <p:nvSpPr>
+          <p:cNvPr id="3" name="Notes Placeholder 2"/>
+          <p:cNvSpPr>
+            <a:spLocks noGrp="1"/>
+          </p:cNvSpPr>
+          <p:nvPr>
+            <p:ph type="body" idx="1"/>
+          </p:nvPr>
+        </p:nvSpPr>
+        <p:spPr/>
+        <p:txBody>
+          <a:bodyPr/>
+          <a:lstStyle/>
+          <a:p>
+            <a:r>
+              <a:rPr lang="en-DE" dirty="0"/>
+              <a:t>Alex</a:t>
+            </a:r>
+          </a:p>
+        </p:txBody>
+      </p:sp>
+      <p:sp>
+        <p:nvSpPr>
+          <p:cNvPr id="4" name="Slide Number Placeholder 3"/>
+          <p:cNvSpPr>
+            <a:spLocks noGrp="1"/>
+          </p:cNvSpPr>
+          <p:nvPr>
+            <p:ph type="sldNum" sz="quarter" idx="5"/>
+          </p:nvPr>
+        </p:nvSpPr>
+        <p:spPr/>
+        <p:txBody>
+          <a:bodyPr/>
+          <a:lstStyle/>
+          <a:p>
+            <a:fld id="{AEAFCDA7-1A8B-6E40-88EB-952C2E72DED4}" type="slidenum">
+              <a:rPr lang="de-DE" smtClean="0"/>
+              <a:t>23</a:t>
+            </a:fld>
+            <a:endParaRPr lang="de-DE"/>
+          </a:p>
+        </p:txBody>
+      </p:sp>
+    </p:spTree>
+    <p:extLst>
+      <p:ext uri="{BB962C8B-B14F-4D97-AF65-F5344CB8AC3E}">
+        <p14:creationId xmlns:p14="http://schemas.microsoft.com/office/powerpoint/2010/main" val="1336713672"/>
+      </p:ext>
+    </p:extLst>
+  </p:cSld>
+  <p:clrMapOvr>
+    <a:masterClrMapping/>
+  </p:clrMapOvr>
+</p:notes>
+</file>
+
+<file path=ppt/notesSlides/notesSlide21.xml><?xml version="1.0" encoding="utf-8"?>
+<p:notes xmlns:a="http://schemas.openxmlformats.org/drawingml/2006/main" xmlns:r="http://schemas.openxmlformats.org/officeDocument/2006/relationships" xmlns:p="http://schemas.openxmlformats.org/presentationml/2006/main">
+  <p:cSld>
+    <p:spTree>
+      <p:nvGrpSpPr>
+        <p:cNvPr id="1" name=""/>
+        <p:cNvGrpSpPr/>
+        <p:nvPr/>
+      </p:nvGrpSpPr>
+      <p:grpSpPr>
+        <a:xfrm>
+          <a:off x="0" y="0"/>
+          <a:ext cx="0" cy="0"/>
+          <a:chOff x="0" y="0"/>
+          <a:chExt cx="0" cy="0"/>
+        </a:xfrm>
+      </p:grpSpPr>
+      <p:sp>
+        <p:nvSpPr>
+          <p:cNvPr id="2" name="Folienbildplatzhalter 1"/>
+          <p:cNvSpPr>
+            <a:spLocks noGrp="1" noRot="1" noChangeAspect="1"/>
+          </p:cNvSpPr>
+          <p:nvPr>
+            <p:ph type="sldImg"/>
+          </p:nvPr>
+        </p:nvSpPr>
+        <p:spPr/>
+      </p:sp>
+      <p:sp>
+        <p:nvSpPr>
+          <p:cNvPr id="3" name="Notizenplatzhalter 2"/>
+          <p:cNvSpPr>
+            <a:spLocks noGrp="1"/>
+          </p:cNvSpPr>
+          <p:nvPr>
+            <p:ph type="body" idx="1"/>
+          </p:nvPr>
+        </p:nvSpPr>
+        <p:spPr/>
+        <p:txBody>
+          <a:bodyPr/>
+          <a:lstStyle/>
+          <a:p>
+            <a:endParaRPr lang="de-DE" dirty="0"/>
+          </a:p>
+        </p:txBody>
+      </p:sp>
+      <p:sp>
+        <p:nvSpPr>
+          <p:cNvPr id="4" name="Foliennummernplatzhalter 3"/>
+          <p:cNvSpPr>
+            <a:spLocks noGrp="1"/>
+          </p:cNvSpPr>
+          <p:nvPr>
+            <p:ph type="sldNum" sz="quarter" idx="5"/>
+          </p:nvPr>
+        </p:nvSpPr>
+        <p:spPr/>
+        <p:txBody>
+          <a:bodyPr/>
+          <a:lstStyle/>
+          <a:p>
+            <a:fld id="{AEAFCDA7-1A8B-6E40-88EB-952C2E72DED4}" type="slidenum">
+              <a:rPr lang="de-DE" smtClean="0"/>
+              <a:t>24</a:t>
+            </a:fld>
+            <a:endParaRPr lang="de-DE"/>
+          </a:p>
+        </p:txBody>
+      </p:sp>
+    </p:spTree>
+    <p:extLst>
+      <p:ext uri="{BB962C8B-B14F-4D97-AF65-F5344CB8AC3E}">
+        <p14:creationId xmlns:p14="http://schemas.microsoft.com/office/powerpoint/2010/main" val="4266848986"/>
       </p:ext>
     </p:extLst>
   </p:cSld>
@@ -1895,7 +2831,7 @@
       </p:grpSpPr>
       <p:sp>
         <p:nvSpPr>
-          <p:cNvPr id="2" name="Folienbildplatzhalter 1"/>
+          <p:cNvPr id="2" name="Slide Image Placeholder 1"/>
           <p:cNvSpPr>
             <a:spLocks noGrp="1" noRot="1" noChangeAspect="1"/>
           </p:cNvSpPr>
@@ -1907,7 +2843,7 @@
       </p:sp>
       <p:sp>
         <p:nvSpPr>
-          <p:cNvPr id="3" name="Notizenplatzhalter 2"/>
+          <p:cNvPr id="3" name="Notes Placeholder 2"/>
           <p:cNvSpPr>
             <a:spLocks noGrp="1"/>
           </p:cNvSpPr>
@@ -1920,105 +2856,16 @@
           <a:bodyPr/>
           <a:lstStyle/>
           <a:p>
-            <a:pPr marL="171450" marR="0" lvl="0" indent="-171450" algn="l" defTabSz="914400" rtl="0" eaLnBrk="1" fontAlgn="auto" latinLnBrk="0" hangingPunct="1">
-              <a:lnSpc>
-                <a:spcPct val="100000"/>
-              </a:lnSpc>
-              <a:spcBef>
-                <a:spcPts val="0"/>
-              </a:spcBef>
-              <a:spcAft>
-                <a:spcPts val="0"/>
-              </a:spcAft>
-              <a:buClrTx/>
-              <a:buSzTx/>
-              <a:buFontTx/>
-              <a:buChar char="-"/>
-              <a:tabLst/>
-              <a:defRPr/>
-            </a:pPr>
-            <a:r>
-              <a:rPr lang="de-DE" dirty="0"/>
-              <a:t>Demonstration on </a:t>
-            </a:r>
-            <a:r>
-              <a:rPr lang="de-DE" dirty="0" err="1"/>
-              <a:t>branch</a:t>
-            </a:r>
-            <a:r>
-              <a:rPr lang="de-DE" dirty="0"/>
-              <a:t> </a:t>
-            </a:r>
-            <a:r>
-              <a:rPr lang="de-DE" dirty="0" err="1"/>
-              <a:t>LoadingWaterfall_Demo</a:t>
-            </a:r>
-            <a:r>
-              <a:rPr lang="de-DE" dirty="0"/>
-              <a:t>!</a:t>
-            </a:r>
-          </a:p>
-          <a:p>
-            <a:pPr marL="171450" marR="0" lvl="0" indent="-171450" algn="l" defTabSz="914400" rtl="0" eaLnBrk="1" fontAlgn="auto" latinLnBrk="0" hangingPunct="1">
-              <a:lnSpc>
-                <a:spcPct val="100000"/>
-              </a:lnSpc>
-              <a:spcBef>
-                <a:spcPts val="0"/>
-              </a:spcBef>
-              <a:spcAft>
-                <a:spcPts val="0"/>
-              </a:spcAft>
-              <a:buClrTx/>
-              <a:buSzTx/>
-              <a:buFontTx/>
-              <a:buChar char="-"/>
-              <a:tabLst/>
-              <a:defRPr/>
-            </a:pPr>
-            <a:r>
-              <a:rPr lang="de-DE" dirty="0" err="1"/>
-              <a:t>Waterfall</a:t>
-            </a:r>
-            <a:r>
-              <a:rPr lang="de-DE" dirty="0"/>
-              <a:t> </a:t>
-            </a:r>
-            <a:r>
-              <a:rPr lang="de-DE" dirty="0" err="1"/>
-              <a:t>or</a:t>
-            </a:r>
-            <a:r>
-              <a:rPr lang="de-DE" dirty="0"/>
-              <a:t> </a:t>
-            </a:r>
-            <a:r>
-              <a:rPr lang="de-DE" dirty="0" err="1"/>
-              <a:t>bad</a:t>
-            </a:r>
-            <a:r>
-              <a:rPr lang="de-DE" dirty="0"/>
-              <a:t> </a:t>
-            </a:r>
-            <a:r>
-              <a:rPr lang="de-DE" dirty="0" err="1"/>
-              <a:t>user</a:t>
-            </a:r>
-            <a:r>
-              <a:rPr lang="de-DE" dirty="0"/>
-              <a:t> </a:t>
-            </a:r>
-            <a:r>
-              <a:rPr lang="de-DE" dirty="0" err="1"/>
-              <a:t>experience</a:t>
-            </a:r>
-            <a:endParaRPr lang="de-DE" dirty="0"/>
+            <a:r>
+              <a:rPr lang="en-DE" dirty="0"/>
+              <a:t>Alex</a:t>
+            </a:r>
           </a:p>
         </p:txBody>
       </p:sp>
       <p:sp>
         <p:nvSpPr>
-          <p:cNvPr id="4" name="Foliennummernplatzhalter 3"/>
+          <p:cNvPr id="4" name="Slide Number Placeholder 3"/>
           <p:cNvSpPr>
             <a:spLocks noGrp="1"/>
           </p:cNvSpPr>
@@ -2033,7 +2880,7 @@
           <a:p>
             <a:fld id="{AEAFCDA7-1A8B-6E40-88EB-952C2E72DED4}" type="slidenum">
               <a:rPr lang="de-DE" smtClean="0"/>
-              <a:t>6</a:t>
+              <a:t>3</a:t>
             </a:fld>
             <a:endParaRPr lang="de-DE"/>
           </a:p>
@@ -2042,7 +2889,7 @@
     </p:spTree>
     <p:extLst>
       <p:ext uri="{BB962C8B-B14F-4D97-AF65-F5344CB8AC3E}">
-        <p14:creationId xmlns:p14="http://schemas.microsoft.com/office/powerpoint/2010/main" val="1390276184"/>
+        <p14:creationId xmlns:p14="http://schemas.microsoft.com/office/powerpoint/2010/main" val="187723867"/>
       </p:ext>
     </p:extLst>
   </p:cSld>
@@ -2071,7 +2918,7 @@
       </p:grpSpPr>
       <p:sp>
         <p:nvSpPr>
-          <p:cNvPr id="2" name="Folienbildplatzhalter 1"/>
+          <p:cNvPr id="2" name="Slide Image Placeholder 1"/>
           <p:cNvSpPr>
             <a:spLocks noGrp="1" noRot="1" noChangeAspect="1"/>
           </p:cNvSpPr>
@@ -2083,7 +2930,7 @@
       </p:sp>
       <p:sp>
         <p:nvSpPr>
-          <p:cNvPr id="3" name="Notizenplatzhalter 2"/>
+          <p:cNvPr id="3" name="Notes Placeholder 2"/>
           <p:cNvSpPr>
             <a:spLocks noGrp="1"/>
           </p:cNvSpPr>
@@ -2097,60 +2944,15 @@
           <a:lstStyle/>
           <a:p>
             <a:r>
-              <a:rPr lang="de-DE" dirty="0"/>
-              <a:t>- </a:t>
-            </a:r>
-            <a:r>
-              <a:rPr lang="de-DE" dirty="0" err="1"/>
-              <a:t>Visualization</a:t>
-            </a:r>
-            <a:r>
-              <a:rPr lang="de-DE" dirty="0"/>
-              <a:t> </a:t>
-            </a:r>
-            <a:r>
-              <a:rPr lang="de-DE" dirty="0" err="1"/>
-              <a:t>of</a:t>
-            </a:r>
-            <a:r>
-              <a:rPr lang="de-DE" dirty="0"/>
-              <a:t> </a:t>
-            </a:r>
-            <a:r>
-              <a:rPr lang="de-DE" dirty="0" err="1"/>
-              <a:t>the</a:t>
-            </a:r>
-            <a:r>
-              <a:rPr lang="de-DE" dirty="0"/>
-              <a:t> </a:t>
-            </a:r>
-            <a:r>
-              <a:rPr lang="de-DE" dirty="0" err="1"/>
-              <a:t>client</a:t>
-            </a:r>
-            <a:r>
-              <a:rPr lang="de-DE" dirty="0"/>
-              <a:t> </a:t>
-            </a:r>
-            <a:r>
-              <a:rPr lang="de-DE" dirty="0" err="1"/>
-              <a:t>server</a:t>
-            </a:r>
-            <a:r>
-              <a:rPr lang="de-DE" dirty="0"/>
-              <a:t> </a:t>
-            </a:r>
-            <a:r>
-              <a:rPr lang="de-DE" dirty="0" err="1"/>
-              <a:t>waterfall</a:t>
-            </a:r>
-            <a:endParaRPr lang="de-DE" dirty="0"/>
+              <a:rPr lang="en-DE" dirty="0"/>
+              <a:t>Alex</a:t>
+            </a:r>
           </a:p>
         </p:txBody>
       </p:sp>
       <p:sp>
         <p:nvSpPr>
-          <p:cNvPr id="4" name="Foliennummernplatzhalter 3"/>
+          <p:cNvPr id="4" name="Slide Number Placeholder 3"/>
           <p:cNvSpPr>
             <a:spLocks noGrp="1"/>
           </p:cNvSpPr>
@@ -2165,7 +2967,7 @@
           <a:p>
             <a:fld id="{AEAFCDA7-1A8B-6E40-88EB-952C2E72DED4}" type="slidenum">
               <a:rPr lang="de-DE" smtClean="0"/>
-              <a:t>7</a:t>
+              <a:t>4</a:t>
             </a:fld>
             <a:endParaRPr lang="de-DE"/>
           </a:p>
@@ -2174,7 +2976,7 @@
     </p:spTree>
     <p:extLst>
       <p:ext uri="{BB962C8B-B14F-4D97-AF65-F5344CB8AC3E}">
-        <p14:creationId xmlns:p14="http://schemas.microsoft.com/office/powerpoint/2010/main" val="1528683665"/>
+        <p14:creationId xmlns:p14="http://schemas.microsoft.com/office/powerpoint/2010/main" val="815601783"/>
       </p:ext>
     </p:extLst>
   </p:cSld>
@@ -2228,7 +3030,10 @@
           <a:bodyPr/>
           <a:lstStyle/>
           <a:p>
-            <a:endParaRPr lang="de-DE" dirty="0"/>
+            <a:r>
+              <a:rPr lang="de-DE" dirty="0"/>
+              <a:t>Alex</a:t>
+            </a:r>
           </a:p>
         </p:txBody>
       </p:sp>
@@ -2249,7 +3054,7 @@
           <a:p>
             <a:fld id="{AEAFCDA7-1A8B-6E40-88EB-952C2E72DED4}" type="slidenum">
               <a:rPr lang="de-DE" smtClean="0"/>
-              <a:t>8</a:t>
+              <a:t>5</a:t>
             </a:fld>
             <a:endParaRPr lang="de-DE"/>
           </a:p>
@@ -2258,7 +3063,7 @@
     </p:spTree>
     <p:extLst>
       <p:ext uri="{BB962C8B-B14F-4D97-AF65-F5344CB8AC3E}">
-        <p14:creationId xmlns:p14="http://schemas.microsoft.com/office/powerpoint/2010/main" val="1675446476"/>
+        <p14:creationId xmlns:p14="http://schemas.microsoft.com/office/powerpoint/2010/main" val="2375457377"/>
       </p:ext>
     </p:extLst>
   </p:cSld>
@@ -2312,13 +3117,73 @@
           <a:bodyPr/>
           <a:lstStyle/>
           <a:p>
-            <a:pPr marL="171450" indent="-171450">
+            <a:pPr marL="171450" marR="0" lvl="0" indent="-171450" algn="l" defTabSz="914400" rtl="0" eaLnBrk="1" fontAlgn="auto" latinLnBrk="0" hangingPunct="1">
+              <a:lnSpc>
+                <a:spcPct val="100000"/>
+              </a:lnSpc>
+              <a:spcBef>
+                <a:spcPts val="0"/>
+              </a:spcBef>
+              <a:spcAft>
+                <a:spcPts val="0"/>
+              </a:spcAft>
+              <a:buClrTx/>
+              <a:buSzTx/>
               <a:buFontTx/>
               <a:buChar char="-"/>
+              <a:tabLst/>
+              <a:defRPr/>
             </a:pPr>
             <a:r>
+              <a:rPr lang="de-DE" dirty="0"/>
+              <a:t>Alex</a:t>
+            </a:r>
+          </a:p>
+          <a:p>
+            <a:pPr marL="171450" marR="0" lvl="0" indent="-171450" algn="l" defTabSz="914400" rtl="0" eaLnBrk="1" fontAlgn="auto" latinLnBrk="0" hangingPunct="1">
+              <a:lnSpc>
+                <a:spcPct val="100000"/>
+              </a:lnSpc>
+              <a:spcBef>
+                <a:spcPts val="0"/>
+              </a:spcBef>
+              <a:spcAft>
+                <a:spcPts val="0"/>
+              </a:spcAft>
+              <a:buClrTx/>
+              <a:buSzTx/>
+              <a:buFontTx/>
+              <a:buChar char="-"/>
+              <a:tabLst/>
+              <a:defRPr/>
+            </a:pPr>
+            <a:endParaRPr lang="de-DE" dirty="0"/>
+          </a:p>
+          <a:p>
+            <a:pPr marL="171450" marR="0" lvl="0" indent="-171450" algn="l" defTabSz="914400" rtl="0" eaLnBrk="1" fontAlgn="auto" latinLnBrk="0" hangingPunct="1">
+              <a:lnSpc>
+                <a:spcPct val="100000"/>
+              </a:lnSpc>
+              <a:spcBef>
+                <a:spcPts val="0"/>
+              </a:spcBef>
+              <a:spcAft>
+                <a:spcPts val="0"/>
+              </a:spcAft>
+              <a:buClrTx/>
+              <a:buSzTx/>
+              <a:buFontTx/>
+              <a:buChar char="-"/>
+              <a:tabLst/>
+              <a:defRPr/>
+            </a:pPr>
+            <a:r>
+              <a:rPr lang="de-DE" dirty="0"/>
+              <a:t>Demonstration on </a:t>
+            </a:r>
+            <a:r>
               <a:rPr lang="de-DE" dirty="0" err="1"/>
-              <a:t>We</a:t>
+              <a:t>branch</a:t>
             </a:r>
             <a:r>
               <a:rPr lang="de-DE" dirty="0"/>
@@ -2326,7 +3191,34 @@
             </a:r>
             <a:r>
               <a:rPr lang="de-DE" dirty="0" err="1"/>
-              <a:t>can</a:t>
+              <a:t>LoadingWaterfall_Demo</a:t>
+            </a:r>
+            <a:r>
+              <a:rPr lang="de-DE" dirty="0"/>
+              <a:t>!</a:t>
+            </a:r>
+          </a:p>
+          <a:p>
+            <a:pPr marL="171450" marR="0" lvl="0" indent="-171450" algn="l" defTabSz="914400" rtl="0" eaLnBrk="1" fontAlgn="auto" latinLnBrk="0" hangingPunct="1">
+              <a:lnSpc>
+                <a:spcPct val="100000"/>
+              </a:lnSpc>
+              <a:spcBef>
+                <a:spcPts val="0"/>
+              </a:spcBef>
+              <a:spcAft>
+                <a:spcPts val="0"/>
+              </a:spcAft>
+              <a:buClrTx/>
+              <a:buSzTx/>
+              <a:buFontTx/>
+              <a:buChar char="-"/>
+              <a:tabLst/>
+              <a:defRPr/>
+            </a:pPr>
+            <a:r>
+              <a:rPr lang="de-DE" dirty="0" err="1"/>
+              <a:t>Waterfall</a:t>
             </a:r>
             <a:r>
               <a:rPr lang="de-DE" dirty="0"/>
@@ -2334,7 +3226,7 @@
             </a:r>
             <a:r>
               <a:rPr lang="de-DE" dirty="0" err="1"/>
-              <a:t>solve</a:t>
+              <a:t>or</a:t>
             </a:r>
             <a:r>
               <a:rPr lang="de-DE" dirty="0"/>
@@ -2342,7 +3234,7 @@
             </a:r>
             <a:r>
               <a:rPr lang="de-DE" dirty="0" err="1"/>
-              <a:t>the</a:t>
+              <a:t>bad</a:t>
             </a:r>
             <a:r>
               <a:rPr lang="de-DE" dirty="0"/>
@@ -2350,7 +3242,7 @@
             </a:r>
             <a:r>
               <a:rPr lang="de-DE" dirty="0" err="1"/>
-              <a:t>bad</a:t>
+              <a:t>user</a:t>
             </a:r>
             <a:r>
               <a:rPr lang="de-DE" dirty="0"/>
@@ -2358,300 +3250,9 @@
             </a:r>
             <a:r>
               <a:rPr lang="de-DE" dirty="0" err="1"/>
-              <a:t>user</a:t>
-            </a:r>
-            <a:r>
-              <a:rPr lang="de-DE" dirty="0"/>
-              <a:t> </a:t>
-            </a:r>
-            <a:r>
-              <a:rPr lang="de-DE" dirty="0" err="1"/>
               <a:t>experience</a:t>
             </a:r>
-            <a:r>
-              <a:rPr lang="de-DE" dirty="0"/>
-              <a:t> </a:t>
-            </a:r>
-            <a:r>
-              <a:rPr lang="de-DE" dirty="0" err="1"/>
-              <a:t>if</a:t>
-            </a:r>
-            <a:r>
-              <a:rPr lang="de-DE" dirty="0"/>
-              <a:t> </a:t>
-            </a:r>
-            <a:r>
-              <a:rPr lang="de-DE" dirty="0" err="1"/>
-              <a:t>we</a:t>
-            </a:r>
-            <a:r>
-              <a:rPr lang="de-DE" dirty="0"/>
-              <a:t> </a:t>
-            </a:r>
-            <a:r>
-              <a:rPr lang="de-DE" dirty="0" err="1"/>
-              <a:t>accept</a:t>
-            </a:r>
-            <a:r>
-              <a:rPr lang="de-DE" dirty="0"/>
-              <a:t> </a:t>
-            </a:r>
-            <a:r>
-              <a:rPr lang="de-DE" dirty="0" err="1"/>
-              <a:t>the</a:t>
-            </a:r>
-            <a:r>
-              <a:rPr lang="de-DE" dirty="0"/>
-              <a:t> </a:t>
-            </a:r>
-            <a:r>
-              <a:rPr lang="de-DE" dirty="0" err="1"/>
-              <a:t>waterfall</a:t>
-            </a:r>
-            <a:r>
-              <a:rPr lang="de-DE" dirty="0"/>
-              <a:t>. So </a:t>
-            </a:r>
-            <a:r>
-              <a:rPr lang="de-DE" dirty="0" err="1"/>
-              <a:t>how</a:t>
-            </a:r>
-            <a:r>
-              <a:rPr lang="de-DE" dirty="0"/>
-              <a:t> </a:t>
-            </a:r>
-            <a:r>
-              <a:rPr lang="de-DE" dirty="0" err="1"/>
-              <a:t>can</a:t>
-            </a:r>
-            <a:r>
-              <a:rPr lang="de-DE" dirty="0"/>
-              <a:t> </a:t>
-            </a:r>
-            <a:r>
-              <a:rPr lang="de-DE" dirty="0" err="1"/>
-              <a:t>we</a:t>
-            </a:r>
-            <a:r>
-              <a:rPr lang="de-DE" dirty="0"/>
-              <a:t> deal </a:t>
-            </a:r>
-            <a:r>
-              <a:rPr lang="de-DE" dirty="0" err="1"/>
-              <a:t>with</a:t>
-            </a:r>
-            <a:r>
-              <a:rPr lang="de-DE" dirty="0"/>
-              <a:t> </a:t>
-            </a:r>
-            <a:r>
-              <a:rPr lang="de-DE" dirty="0" err="1"/>
-              <a:t>the</a:t>
-            </a:r>
-            <a:r>
-              <a:rPr lang="de-DE" dirty="0"/>
-              <a:t> </a:t>
-            </a:r>
-            <a:r>
-              <a:rPr lang="de-DE" dirty="0" err="1"/>
-              <a:t>client</a:t>
-            </a:r>
-            <a:r>
-              <a:rPr lang="de-DE" dirty="0"/>
-              <a:t> </a:t>
-            </a:r>
-            <a:r>
-              <a:rPr lang="de-DE" dirty="0" err="1"/>
-              <a:t>server</a:t>
-            </a:r>
-            <a:r>
-              <a:rPr lang="de-DE" dirty="0"/>
-              <a:t> </a:t>
-            </a:r>
-            <a:r>
-              <a:rPr lang="de-DE" dirty="0" err="1"/>
-              <a:t>waterfall</a:t>
-            </a:r>
-            <a:r>
-              <a:rPr lang="de-DE" dirty="0"/>
-              <a:t>?</a:t>
-            </a:r>
-          </a:p>
-          <a:p>
-            <a:pPr marL="171450" indent="-171450">
-              <a:buFontTx/>
-              <a:buChar char="-"/>
-            </a:pPr>
-            <a:r>
-              <a:rPr lang="de-DE" dirty="0" err="1"/>
-              <a:t>Idea</a:t>
-            </a:r>
-            <a:r>
-              <a:rPr lang="de-DE" dirty="0"/>
-              <a:t>: </a:t>
-            </a:r>
-            <a:r>
-              <a:rPr lang="de-DE" dirty="0" err="1"/>
-              <a:t>locate</a:t>
-            </a:r>
-            <a:r>
-              <a:rPr lang="de-DE" dirty="0"/>
-              <a:t> </a:t>
-            </a:r>
-            <a:r>
-              <a:rPr lang="de-DE" dirty="0" err="1"/>
-              <a:t>React</a:t>
-            </a:r>
-            <a:r>
-              <a:rPr lang="de-DE" dirty="0"/>
-              <a:t> </a:t>
-            </a:r>
-            <a:r>
-              <a:rPr lang="de-DE" dirty="0" err="1"/>
-              <a:t>components</a:t>
-            </a:r>
-            <a:r>
-              <a:rPr lang="de-DE" dirty="0"/>
-              <a:t> on </a:t>
-            </a:r>
-            <a:r>
-              <a:rPr lang="de-DE" dirty="0" err="1"/>
-              <a:t>the</a:t>
-            </a:r>
-            <a:r>
-              <a:rPr lang="de-DE" dirty="0"/>
-              <a:t> </a:t>
-            </a:r>
-            <a:r>
-              <a:rPr lang="de-DE" dirty="0" err="1"/>
-              <a:t>server</a:t>
-            </a:r>
-            <a:r>
-              <a:rPr lang="de-DE" dirty="0"/>
-              <a:t>.</a:t>
-            </a:r>
-          </a:p>
-          <a:p>
-            <a:pPr marL="171450" indent="-171450">
-              <a:buFontTx/>
-              <a:buChar char="-"/>
-            </a:pPr>
-            <a:r>
-              <a:rPr lang="de-DE" dirty="0"/>
-              <a:t>Still a </a:t>
-            </a:r>
-            <a:r>
-              <a:rPr lang="de-DE" dirty="0" err="1"/>
-              <a:t>waterfall</a:t>
-            </a:r>
-            <a:r>
-              <a:rPr lang="de-DE" dirty="0"/>
-              <a:t> but </a:t>
-            </a:r>
-            <a:r>
-              <a:rPr lang="de-DE" dirty="0" err="1"/>
-              <a:t>since</a:t>
-            </a:r>
-            <a:r>
-              <a:rPr lang="de-DE" dirty="0"/>
-              <a:t> </a:t>
-            </a:r>
-            <a:r>
-              <a:rPr lang="de-DE" dirty="0" err="1"/>
-              <a:t>we</a:t>
-            </a:r>
-            <a:r>
-              <a:rPr lang="de-DE" dirty="0"/>
-              <a:t> </a:t>
-            </a:r>
-            <a:r>
-              <a:rPr lang="de-DE" dirty="0" err="1"/>
-              <a:t>are</a:t>
-            </a:r>
-            <a:r>
-              <a:rPr lang="de-DE" dirty="0"/>
-              <a:t> </a:t>
-            </a:r>
-            <a:r>
-              <a:rPr lang="de-DE" dirty="0" err="1"/>
-              <a:t>operating</a:t>
-            </a:r>
-            <a:r>
-              <a:rPr lang="de-DE" dirty="0"/>
-              <a:t> on </a:t>
-            </a:r>
-            <a:r>
-              <a:rPr lang="de-DE" dirty="0" err="1"/>
-              <a:t>the</a:t>
-            </a:r>
-            <a:r>
-              <a:rPr lang="de-DE" dirty="0"/>
-              <a:t> </a:t>
-            </a:r>
-            <a:r>
-              <a:rPr lang="de-DE" dirty="0" err="1"/>
-              <a:t>server</a:t>
-            </a:r>
-            <a:r>
-              <a:rPr lang="de-DE" dirty="0"/>
-              <a:t>, </a:t>
-            </a:r>
-            <a:r>
-              <a:rPr lang="de-DE" dirty="0" err="1"/>
-              <a:t>request</a:t>
-            </a:r>
-            <a:r>
-              <a:rPr lang="de-DE" dirty="0"/>
-              <a:t> </a:t>
-            </a:r>
-            <a:r>
-              <a:rPr lang="de-DE" dirty="0" err="1"/>
-              <a:t>times</a:t>
-            </a:r>
-            <a:r>
-              <a:rPr lang="de-DE" dirty="0"/>
-              <a:t> </a:t>
-            </a:r>
-            <a:r>
-              <a:rPr lang="de-DE" dirty="0" err="1"/>
-              <a:t>should</a:t>
-            </a:r>
-            <a:r>
-              <a:rPr lang="de-DE" dirty="0"/>
-              <a:t> </a:t>
-            </a:r>
-            <a:r>
-              <a:rPr lang="de-DE" dirty="0" err="1"/>
-              <a:t>be</a:t>
-            </a:r>
-            <a:r>
-              <a:rPr lang="de-DE" dirty="0"/>
-              <a:t> </a:t>
-            </a:r>
-            <a:r>
-              <a:rPr lang="de-DE" dirty="0" err="1"/>
-              <a:t>much</a:t>
-            </a:r>
-            <a:r>
-              <a:rPr lang="de-DE" dirty="0"/>
-              <a:t> </a:t>
-            </a:r>
-            <a:r>
-              <a:rPr lang="de-DE" dirty="0" err="1"/>
-              <a:t>shorter</a:t>
-            </a:r>
-            <a:r>
-              <a:rPr lang="de-DE" dirty="0"/>
-              <a:t> in </a:t>
-            </a:r>
-            <a:r>
-              <a:rPr lang="de-DE" dirty="0" err="1"/>
-              <a:t>general</a:t>
-            </a:r>
-            <a:r>
-              <a:rPr lang="de-DE" dirty="0"/>
-              <a:t>.</a:t>
-            </a:r>
+            <a:endParaRPr lang="de-DE" dirty="0"/>
           </a:p>
         </p:txBody>
       </p:sp>
@@ -2672,7 +3273,7 @@
           <a:p>
             <a:fld id="{AEAFCDA7-1A8B-6E40-88EB-952C2E72DED4}" type="slidenum">
               <a:rPr lang="de-DE" smtClean="0"/>
-              <a:t>9</a:t>
+              <a:t>6</a:t>
             </a:fld>
             <a:endParaRPr lang="de-DE"/>
           </a:p>
@@ -2681,7 +3282,7 @@
     </p:spTree>
     <p:extLst>
       <p:ext uri="{BB962C8B-B14F-4D97-AF65-F5344CB8AC3E}">
-        <p14:creationId xmlns:p14="http://schemas.microsoft.com/office/powerpoint/2010/main" val="3833017881"/>
+        <p14:creationId xmlns:p14="http://schemas.microsoft.com/office/powerpoint/2010/main" val="1390276184"/>
       </p:ext>
     </p:extLst>
   </p:cSld>
@@ -2735,17 +3336,22 @@
           <a:bodyPr/>
           <a:lstStyle/>
           <a:p>
-            <a:pPr marL="171450" indent="-171450">
-              <a:buFontTx/>
-              <a:buChar char="-"/>
-            </a:pPr>
             <a:r>
               <a:rPr lang="de-DE" dirty="0"/>
-              <a:t>Old: Client </a:t>
+              <a:t>Alex</a:t>
+            </a:r>
+          </a:p>
+          <a:p>
+            <a:endParaRPr lang="de-DE" dirty="0"/>
+          </a:p>
+          <a:p>
+            <a:r>
+              <a:rPr lang="de-DE" dirty="0"/>
+              <a:t>- </a:t>
             </a:r>
             <a:r>
               <a:rPr lang="de-DE" dirty="0" err="1"/>
-              <a:t>components</a:t>
+              <a:t>Visualization</a:t>
             </a:r>
             <a:r>
               <a:rPr lang="de-DE" dirty="0"/>
@@ -2753,22 +3359,7 @@
             </a:r>
             <a:r>
               <a:rPr lang="de-DE" dirty="0" err="1"/>
-              <a:t>only</a:t>
-            </a:r>
-            <a:endParaRPr lang="de-DE" dirty="0"/>
-          </a:p>
-          <a:p>
-            <a:pPr marL="171450" indent="-171450">
-              <a:buFontTx/>
-              <a:buChar char="-"/>
-            </a:pPr>
-            <a:r>
-              <a:rPr lang="de-DE" dirty="0"/>
-              <a:t>New: Server </a:t>
-            </a:r>
-            <a:r>
-              <a:rPr lang="de-DE" dirty="0" err="1"/>
-              <a:t>and</a:t>
+              <a:t>of</a:t>
             </a:r>
             <a:r>
               <a:rPr lang="de-DE" dirty="0"/>
@@ -2776,7 +3367,7 @@
             </a:r>
             <a:r>
               <a:rPr lang="de-DE" dirty="0" err="1"/>
-              <a:t>shared</a:t>
+              <a:t>the</a:t>
             </a:r>
             <a:r>
               <a:rPr lang="de-DE" dirty="0"/>
@@ -2784,7 +3375,7 @@
             </a:r>
             <a:r>
               <a:rPr lang="de-DE" dirty="0" err="1"/>
-              <a:t>components</a:t>
+              <a:t>client</a:t>
             </a:r>
             <a:r>
               <a:rPr lang="de-DE" dirty="0"/>
@@ -2792,7 +3383,7 @@
             </a:r>
             <a:r>
               <a:rPr lang="de-DE" dirty="0" err="1"/>
-              <a:t>where</a:t>
+              <a:t>server</a:t>
             </a:r>
             <a:r>
               <a:rPr lang="de-DE" dirty="0"/>
@@ -2800,155 +3391,9 @@
             </a:r>
             <a:r>
               <a:rPr lang="de-DE" dirty="0" err="1"/>
-              <a:t>useful</a:t>
+              <a:t>waterfall</a:t>
             </a:r>
             <a:endParaRPr lang="de-DE" dirty="0"/>
-          </a:p>
-          <a:p>
-            <a:pPr marL="628650" lvl="1" indent="-171450">
-              <a:buFontTx/>
-              <a:buChar char="-"/>
-            </a:pPr>
-            <a:r>
-              <a:rPr lang="de-DE" dirty="0"/>
-              <a:t>Client </a:t>
-            </a:r>
-            <a:r>
-              <a:rPr lang="de-DE" dirty="0" err="1"/>
-              <a:t>components</a:t>
-            </a:r>
-            <a:r>
-              <a:rPr lang="de-DE" dirty="0"/>
-              <a:t> </a:t>
-            </a:r>
-            <a:r>
-              <a:rPr lang="de-DE" dirty="0" err="1"/>
-              <a:t>are</a:t>
-            </a:r>
-            <a:r>
-              <a:rPr lang="de-DE" dirty="0"/>
-              <a:t> still </a:t>
-            </a:r>
-            <a:r>
-              <a:rPr lang="de-DE" dirty="0" err="1"/>
-              <a:t>important</a:t>
-            </a:r>
-            <a:r>
-              <a:rPr lang="de-DE" dirty="0"/>
-              <a:t>: </a:t>
-            </a:r>
-            <a:r>
-              <a:rPr lang="de-DE" dirty="0" err="1"/>
-              <a:t>If</a:t>
-            </a:r>
-            <a:r>
-              <a:rPr lang="de-DE" dirty="0"/>
-              <a:t> </a:t>
-            </a:r>
-            <a:r>
-              <a:rPr lang="de-DE" dirty="0" err="1"/>
-              <a:t>we</a:t>
-            </a:r>
-            <a:r>
-              <a:rPr lang="de-DE" dirty="0"/>
-              <a:t> </a:t>
-            </a:r>
-            <a:r>
-              <a:rPr lang="de-DE" dirty="0" err="1"/>
-              <a:t>have</a:t>
-            </a:r>
-            <a:r>
-              <a:rPr lang="de-DE" dirty="0"/>
-              <a:t> a high </a:t>
-            </a:r>
-            <a:r>
-              <a:rPr lang="de-DE" dirty="0" err="1"/>
-              <a:t>degree</a:t>
-            </a:r>
-            <a:r>
-              <a:rPr lang="de-DE" dirty="0"/>
-              <a:t> </a:t>
-            </a:r>
-            <a:r>
-              <a:rPr lang="de-DE" dirty="0" err="1"/>
-              <a:t>of</a:t>
-            </a:r>
-            <a:r>
-              <a:rPr lang="de-DE" dirty="0"/>
-              <a:t> </a:t>
-            </a:r>
-            <a:r>
-              <a:rPr lang="de-DE" dirty="0" err="1"/>
-              <a:t>user</a:t>
-            </a:r>
-            <a:r>
-              <a:rPr lang="de-DE" dirty="0"/>
-              <a:t> </a:t>
-            </a:r>
-            <a:r>
-              <a:rPr lang="de-DE" dirty="0" err="1"/>
-              <a:t>interaction</a:t>
-            </a:r>
-            <a:r>
-              <a:rPr lang="de-DE" dirty="0"/>
-              <a:t>, </a:t>
-            </a:r>
-            <a:r>
-              <a:rPr lang="de-DE" dirty="0" err="1"/>
-              <a:t>always</a:t>
-            </a:r>
-            <a:r>
-              <a:rPr lang="de-DE" dirty="0"/>
-              <a:t> </a:t>
-            </a:r>
-            <a:r>
-              <a:rPr lang="de-DE" dirty="0" err="1"/>
-              <a:t>querying</a:t>
-            </a:r>
-            <a:r>
-              <a:rPr lang="de-DE" dirty="0"/>
-              <a:t> </a:t>
-            </a:r>
-            <a:r>
-              <a:rPr lang="de-DE" dirty="0" err="1"/>
-              <a:t>the</a:t>
-            </a:r>
-            <a:r>
-              <a:rPr lang="de-DE" dirty="0"/>
-              <a:t> </a:t>
-            </a:r>
-            <a:r>
-              <a:rPr lang="de-DE" dirty="0" err="1"/>
-              <a:t>server</a:t>
-            </a:r>
-            <a:r>
-              <a:rPr lang="de-DE" dirty="0"/>
-              <a:t> </a:t>
-            </a:r>
-            <a:r>
-              <a:rPr lang="de-DE" dirty="0" err="1"/>
-              <a:t>is</a:t>
-            </a:r>
-            <a:r>
-              <a:rPr lang="de-DE" dirty="0"/>
-              <a:t> a </a:t>
-            </a:r>
-            <a:r>
-              <a:rPr lang="de-DE" dirty="0" err="1"/>
-              <a:t>bad</a:t>
-            </a:r>
-            <a:r>
-              <a:rPr lang="de-DE" dirty="0"/>
-              <a:t> </a:t>
-            </a:r>
-            <a:r>
-              <a:rPr lang="de-DE" dirty="0" err="1"/>
-              <a:t>idea</a:t>
-            </a:r>
-            <a:r>
-              <a:rPr lang="de-DE" dirty="0"/>
-              <a:t>.</a:t>
-            </a:r>
           </a:p>
         </p:txBody>
       </p:sp>
@@ -2969,7 +3414,7 @@
           <a:p>
             <a:fld id="{AEAFCDA7-1A8B-6E40-88EB-952C2E72DED4}" type="slidenum">
               <a:rPr lang="de-DE" smtClean="0"/>
-              <a:t>11</a:t>
+              <a:t>7</a:t>
             </a:fld>
             <a:endParaRPr lang="de-DE"/>
           </a:p>
@@ -2978,7 +3423,7 @@
     </p:spTree>
     <p:extLst>
       <p:ext uri="{BB962C8B-B14F-4D97-AF65-F5344CB8AC3E}">
-        <p14:creationId xmlns:p14="http://schemas.microsoft.com/office/powerpoint/2010/main" val="3636783220"/>
+        <p14:creationId xmlns:p14="http://schemas.microsoft.com/office/powerpoint/2010/main" val="1528683665"/>
       </p:ext>
     </p:extLst>
   </p:cSld>
@@ -3032,7 +3477,10 @@
           <a:bodyPr/>
           <a:lstStyle/>
           <a:p>
-            <a:endParaRPr lang="de-DE" dirty="0"/>
+            <a:r>
+              <a:rPr lang="de-DE" dirty="0"/>
+              <a:t>Alex</a:t>
+            </a:r>
           </a:p>
         </p:txBody>
       </p:sp>
@@ -3053,7 +3501,7 @@
           <a:p>
             <a:fld id="{AEAFCDA7-1A8B-6E40-88EB-952C2E72DED4}" type="slidenum">
               <a:rPr lang="de-DE" smtClean="0"/>
-              <a:t>12</a:t>
+              <a:t>8</a:t>
             </a:fld>
             <a:endParaRPr lang="de-DE"/>
           </a:p>
@@ -3062,7 +3510,7 @@
     </p:spTree>
     <p:extLst>
       <p:ext uri="{BB962C8B-B14F-4D97-AF65-F5344CB8AC3E}">
-        <p14:creationId xmlns:p14="http://schemas.microsoft.com/office/powerpoint/2010/main" val="1591128301"/>
+        <p14:creationId xmlns:p14="http://schemas.microsoft.com/office/powerpoint/2010/main" val="1675446476"/>
       </p:ext>
     </p:extLst>
   </p:cSld>
@@ -3116,13 +3564,30 @@
           <a:bodyPr/>
           <a:lstStyle/>
           <a:p>
+            <a:pPr marL="171450" indent="-171450">
+              <a:buFontTx/>
+              <a:buChar char="-"/>
+            </a:pPr>
             <a:r>
               <a:rPr lang="de-DE" dirty="0"/>
-              <a:t>- </a:t>
-            </a:r>
+              <a:t>Alex</a:t>
+            </a:r>
+          </a:p>
+          <a:p>
+            <a:pPr marL="171450" indent="-171450">
+              <a:buFontTx/>
+              <a:buChar char="-"/>
+            </a:pPr>
+            <a:endParaRPr lang="de-DE" dirty="0"/>
+          </a:p>
+          <a:p>
+            <a:pPr marL="171450" indent="-171450">
+              <a:buFontTx/>
+              <a:buChar char="-"/>
+            </a:pPr>
             <a:r>
               <a:rPr lang="de-DE" dirty="0" err="1"/>
-              <a:t>We´ve</a:t>
+              <a:t>We</a:t>
             </a:r>
             <a:r>
               <a:rPr lang="de-DE" dirty="0"/>
@@ -3130,7 +3595,7 @@
             </a:r>
             <a:r>
               <a:rPr lang="de-DE" dirty="0" err="1"/>
-              <a:t>already</a:t>
+              <a:t>can</a:t>
             </a:r>
             <a:r>
               <a:rPr lang="de-DE" dirty="0"/>
@@ -3138,7 +3603,7 @@
             </a:r>
             <a:r>
               <a:rPr lang="de-DE" dirty="0" err="1"/>
-              <a:t>talked</a:t>
+              <a:t>solve</a:t>
             </a:r>
             <a:r>
               <a:rPr lang="de-DE" dirty="0"/>
@@ -3146,7 +3611,7 @@
             </a:r>
             <a:r>
               <a:rPr lang="de-DE" dirty="0" err="1"/>
-              <a:t>about</a:t>
+              <a:t>the</a:t>
             </a:r>
             <a:r>
               <a:rPr lang="de-DE" dirty="0"/>
@@ -3154,7 +3619,7 @@
             </a:r>
             <a:r>
               <a:rPr lang="de-DE" dirty="0" err="1"/>
-              <a:t>direct</a:t>
+              <a:t>bad</a:t>
             </a:r>
             <a:r>
               <a:rPr lang="de-DE" dirty="0"/>
@@ -3162,7 +3627,7 @@
             </a:r>
             <a:r>
               <a:rPr lang="de-DE" dirty="0" err="1"/>
-              <a:t>server</a:t>
+              <a:t>user</a:t>
             </a:r>
             <a:r>
               <a:rPr lang="de-DE" dirty="0"/>
@@ -3170,7 +3635,7 @@
             </a:r>
             <a:r>
               <a:rPr lang="de-DE" dirty="0" err="1"/>
-              <a:t>access</a:t>
+              <a:t>experience</a:t>
             </a:r>
             <a:r>
               <a:rPr lang="de-DE" dirty="0"/>
@@ -3178,7 +3643,7 @@
             </a:r>
             <a:r>
               <a:rPr lang="de-DE" dirty="0" err="1"/>
-              <a:t>as</a:t>
+              <a:t>if</a:t>
             </a:r>
             <a:r>
               <a:rPr lang="de-DE" dirty="0"/>
@@ -3186,7 +3651,7 @@
             </a:r>
             <a:r>
               <a:rPr lang="de-DE" dirty="0" err="1"/>
-              <a:t>well</a:t>
+              <a:t>we</a:t>
             </a:r>
             <a:r>
               <a:rPr lang="de-DE" dirty="0"/>
@@ -3194,7 +3659,7 @@
             </a:r>
             <a:r>
               <a:rPr lang="de-DE" dirty="0" err="1"/>
-              <a:t>as</a:t>
+              <a:t>accept</a:t>
             </a:r>
             <a:r>
               <a:rPr lang="de-DE" dirty="0"/>
@@ -3206,7 +3671,7 @@
             </a:r>
             <a:r>
               <a:rPr lang="de-DE" dirty="0"/>
-              <a:t> client-server </a:t>
+              <a:t> </a:t>
             </a:r>
             <a:r>
               <a:rPr lang="de-DE" dirty="0" err="1"/>
@@ -3214,11 +3679,121 @@
             </a:r>
             <a:r>
               <a:rPr lang="de-DE" dirty="0"/>
+              <a:t>. So </a:t>
+            </a:r>
+            <a:r>
+              <a:rPr lang="de-DE" dirty="0" err="1"/>
+              <a:t>how</a:t>
+            </a:r>
+            <a:r>
+              <a:rPr lang="de-DE" dirty="0"/>
               <a:t> </a:t>
             </a:r>
             <a:r>
               <a:rPr lang="de-DE" dirty="0" err="1"/>
-              <a:t>issue</a:t>
+              <a:t>can</a:t>
+            </a:r>
+            <a:r>
+              <a:rPr lang="de-DE" dirty="0"/>
+              <a:t> </a:t>
+            </a:r>
+            <a:r>
+              <a:rPr lang="de-DE" dirty="0" err="1"/>
+              <a:t>we</a:t>
+            </a:r>
+            <a:r>
+              <a:rPr lang="de-DE" dirty="0"/>
+              <a:t> deal </a:t>
+            </a:r>
+            <a:r>
+              <a:rPr lang="de-DE" dirty="0" err="1"/>
+              <a:t>with</a:t>
+            </a:r>
+            <a:r>
+              <a:rPr lang="de-DE" dirty="0"/>
+              <a:t> </a:t>
+            </a:r>
+            <a:r>
+              <a:rPr lang="de-DE" dirty="0" err="1"/>
+              <a:t>the</a:t>
+            </a:r>
+            <a:r>
+              <a:rPr lang="de-DE" dirty="0"/>
+              <a:t> </a:t>
+            </a:r>
+            <a:r>
+              <a:rPr lang="de-DE" dirty="0" err="1"/>
+              <a:t>client</a:t>
+            </a:r>
+            <a:r>
+              <a:rPr lang="de-DE" dirty="0"/>
+              <a:t> </a:t>
+            </a:r>
+            <a:r>
+              <a:rPr lang="de-DE" dirty="0" err="1"/>
+              <a:t>server</a:t>
+            </a:r>
+            <a:r>
+              <a:rPr lang="de-DE" dirty="0"/>
+              <a:t> </a:t>
+            </a:r>
+            <a:r>
+              <a:rPr lang="de-DE" dirty="0" err="1"/>
+              <a:t>waterfall</a:t>
+            </a:r>
+            <a:r>
+              <a:rPr lang="de-DE" dirty="0"/>
+              <a:t>?</a:t>
+            </a:r>
+          </a:p>
+          <a:p>
+            <a:pPr marL="171450" indent="-171450">
+              <a:buFontTx/>
+              <a:buChar char="-"/>
+            </a:pPr>
+            <a:r>
+              <a:rPr lang="de-DE" dirty="0" err="1"/>
+              <a:t>Idea</a:t>
+            </a:r>
+            <a:r>
+              <a:rPr lang="de-DE" dirty="0"/>
+              <a:t>: </a:t>
+            </a:r>
+            <a:r>
+              <a:rPr lang="de-DE" dirty="0" err="1"/>
+              <a:t>locate</a:t>
+            </a:r>
+            <a:r>
+              <a:rPr lang="de-DE" dirty="0"/>
+              <a:t> </a:t>
+            </a:r>
+            <a:r>
+              <a:rPr lang="de-DE" dirty="0" err="1"/>
+              <a:t>React</a:t>
+            </a:r>
+            <a:r>
+              <a:rPr lang="de-DE" dirty="0"/>
+              <a:t> </a:t>
+            </a:r>
+            <a:r>
+              <a:rPr lang="de-DE" dirty="0" err="1"/>
+              <a:t>components</a:t>
+            </a:r>
+            <a:r>
+              <a:rPr lang="de-DE" dirty="0"/>
+              <a:t> on </a:t>
+            </a:r>
+            <a:r>
+              <a:rPr lang="de-DE" dirty="0" err="1"/>
+              <a:t>the</a:t>
+            </a:r>
+            <a:r>
+              <a:rPr lang="de-DE" dirty="0"/>
+              <a:t> </a:t>
+            </a:r>
+            <a:r>
+              <a:rPr lang="de-DE" dirty="0" err="1"/>
+              <a:t>server</a:t>
             </a:r>
             <a:r>
               <a:rPr lang="de-DE" dirty="0"/>
@@ -3226,13 +3801,25 @@
             </a:r>
           </a:p>
           <a:p>
+            <a:pPr marL="171450" indent="-171450">
+              <a:buFontTx/>
+              <a:buChar char="-"/>
+            </a:pPr>
             <a:r>
               <a:rPr lang="de-DE" dirty="0"/>
-              <a:t>- Server </a:t>
+              <a:t>Still a </a:t>
             </a:r>
             <a:r>
               <a:rPr lang="de-DE" dirty="0" err="1"/>
-              <a:t>components</a:t>
+              <a:t>waterfall</a:t>
+            </a:r>
+            <a:r>
+              <a:rPr lang="de-DE" dirty="0"/>
+              <a:t> but </a:t>
+            </a:r>
+            <a:r>
+              <a:rPr lang="de-DE" dirty="0" err="1"/>
+              <a:t>since</a:t>
             </a:r>
             <a:r>
               <a:rPr lang="de-DE" dirty="0"/>
@@ -3240,7 +3827,7 @@
             </a:r>
             <a:r>
               <a:rPr lang="de-DE" dirty="0" err="1"/>
-              <a:t>are</a:t>
+              <a:t>we</a:t>
             </a:r>
             <a:r>
               <a:rPr lang="de-DE" dirty="0"/>
@@ -3248,7 +3835,7 @@
             </a:r>
             <a:r>
               <a:rPr lang="de-DE" dirty="0" err="1"/>
-              <a:t>rendered</a:t>
+              <a:t>are</a:t>
             </a:r>
             <a:r>
               <a:rPr lang="de-DE" dirty="0"/>
@@ -3256,15 +3843,15 @@
             </a:r>
             <a:r>
               <a:rPr lang="de-DE" dirty="0" err="1"/>
-              <a:t>to</a:t>
+              <a:t>operating</a:t>
             </a:r>
             <a:r>
               <a:rPr lang="de-DE" dirty="0"/>
-              <a:t> native HTML </a:t>
+              <a:t> on </a:t>
             </a:r>
             <a:r>
               <a:rPr lang="de-DE" dirty="0" err="1"/>
-              <a:t>elements</a:t>
+              <a:t>the</a:t>
             </a:r>
             <a:r>
               <a:rPr lang="de-DE" dirty="0"/>
@@ -3272,7 +3859,15 @@
             </a:r>
             <a:r>
               <a:rPr lang="de-DE" dirty="0" err="1"/>
-              <a:t>or</a:t>
+              <a:t>server</a:t>
+            </a:r>
+            <a:r>
+              <a:rPr lang="de-DE" dirty="0"/>
+              <a:t>, </a:t>
+            </a:r>
+            <a:r>
+              <a:rPr lang="de-DE" dirty="0" err="1"/>
+              <a:t>request</a:t>
             </a:r>
             <a:r>
               <a:rPr lang="de-DE" dirty="0"/>
@@ -3280,7 +3875,7 @@
             </a:r>
             <a:r>
               <a:rPr lang="de-DE" dirty="0" err="1"/>
-              <a:t>client</a:t>
+              <a:t>times</a:t>
             </a:r>
             <a:r>
               <a:rPr lang="de-DE" dirty="0"/>
@@ -3288,7 +3883,39 @@
             </a:r>
             <a:r>
               <a:rPr lang="de-DE" dirty="0" err="1"/>
-              <a:t>components</a:t>
+              <a:t>should</a:t>
+            </a:r>
+            <a:r>
+              <a:rPr lang="de-DE" dirty="0"/>
+              <a:t> </a:t>
+            </a:r>
+            <a:r>
+              <a:rPr lang="de-DE" dirty="0" err="1"/>
+              <a:t>be</a:t>
+            </a:r>
+            <a:r>
+              <a:rPr lang="de-DE" dirty="0"/>
+              <a:t> </a:t>
+            </a:r>
+            <a:r>
+              <a:rPr lang="de-DE" dirty="0" err="1"/>
+              <a:t>much</a:t>
+            </a:r>
+            <a:r>
+              <a:rPr lang="de-DE" dirty="0"/>
+              <a:t> </a:t>
+            </a:r>
+            <a:r>
+              <a:rPr lang="de-DE" dirty="0" err="1"/>
+              <a:t>shorter</a:t>
+            </a:r>
+            <a:r>
+              <a:rPr lang="de-DE" dirty="0"/>
+              <a:t> in </a:t>
+            </a:r>
+            <a:r>
+              <a:rPr lang="de-DE" dirty="0" err="1"/>
+              <a:t>general</a:t>
             </a:r>
             <a:r>
               <a:rPr lang="de-DE" dirty="0"/>
@@ -3314,7 +3941,7 @@
           <a:p>
             <a:fld id="{AEAFCDA7-1A8B-6E40-88EB-952C2E72DED4}" type="slidenum">
               <a:rPr lang="de-DE" smtClean="0"/>
-              <a:t>13</a:t>
+              <a:t>9</a:t>
             </a:fld>
             <a:endParaRPr lang="de-DE"/>
           </a:p>
@@ -3323,7 +3950,7 @@
     </p:spTree>
     <p:extLst>
       <p:ext uri="{BB962C8B-B14F-4D97-AF65-F5344CB8AC3E}">
-        <p14:creationId xmlns:p14="http://schemas.microsoft.com/office/powerpoint/2010/main" val="980616402"/>
+        <p14:creationId xmlns:p14="http://schemas.microsoft.com/office/powerpoint/2010/main" val="3833017881"/>
       </p:ext>
     </p:extLst>
   </p:cSld>
@@ -15627,7 +16254,7 @@
           <p:nvPr/>
         </p:nvPicPr>
         <p:blipFill>
-          <a:blip r:embed="rId2"/>
+          <a:blip r:embed="rId3"/>
           <a:stretch>
             <a:fillRect/>
           </a:stretch>

</xml_diff>